<commit_message>
Updated the input and impact slides for X4(alcohol)
</commit_message>
<xml_diff>
--- a/presentation/Team-25.pptx
+++ b/presentation/Team-25.pptx
@@ -5,7 +5,7 @@
     <p:sldMasterId id="2147483950" r:id="rId1"/>
   </p:sldMasterIdLst>
   <p:notesMasterIdLst>
-    <p:notesMasterId r:id="rId29"/>
+    <p:notesMasterId r:id="rId30"/>
   </p:notesMasterIdLst>
   <p:sldIdLst>
     <p:sldId id="257" r:id="rId2"/>
@@ -20,21 +20,22 @@
     <p:sldId id="288" r:id="rId11"/>
     <p:sldId id="289" r:id="rId12"/>
     <p:sldId id="290" r:id="rId13"/>
-    <p:sldId id="285" r:id="rId14"/>
-    <p:sldId id="291" r:id="rId15"/>
-    <p:sldId id="292" r:id="rId16"/>
-    <p:sldId id="293" r:id="rId17"/>
-    <p:sldId id="294" r:id="rId18"/>
-    <p:sldId id="284" r:id="rId19"/>
-    <p:sldId id="272" r:id="rId20"/>
-    <p:sldId id="273" r:id="rId21"/>
-    <p:sldId id="275" r:id="rId22"/>
-    <p:sldId id="276" r:id="rId23"/>
-    <p:sldId id="282" r:id="rId24"/>
-    <p:sldId id="277" r:id="rId25"/>
-    <p:sldId id="279" r:id="rId26"/>
-    <p:sldId id="278" r:id="rId27"/>
-    <p:sldId id="281" r:id="rId28"/>
+    <p:sldId id="295" r:id="rId14"/>
+    <p:sldId id="285" r:id="rId15"/>
+    <p:sldId id="291" r:id="rId16"/>
+    <p:sldId id="292" r:id="rId17"/>
+    <p:sldId id="293" r:id="rId18"/>
+    <p:sldId id="294" r:id="rId19"/>
+    <p:sldId id="284" r:id="rId20"/>
+    <p:sldId id="272" r:id="rId21"/>
+    <p:sldId id="273" r:id="rId22"/>
+    <p:sldId id="275" r:id="rId23"/>
+    <p:sldId id="276" r:id="rId24"/>
+    <p:sldId id="282" r:id="rId25"/>
+    <p:sldId id="277" r:id="rId26"/>
+    <p:sldId id="279" r:id="rId27"/>
+    <p:sldId id="278" r:id="rId28"/>
+    <p:sldId id="281" r:id="rId29"/>
   </p:sldIdLst>
   <p:sldSz cx="12192000" cy="6858000"/>
   <p:notesSz cx="6858000" cy="9144000"/>
@@ -223,7 +224,7 @@
           <a:p>
             <a:fld id="{5D44D6BF-B9BD-4338-90A3-91B6768E1A15}" type="datetimeFigureOut">
               <a:rPr lang="en-US" smtClean="0"/>
-              <a:t>4/4/2020</a:t>
+              <a:t>4/7/2020</a:t>
             </a:fld>
             <a:endParaRPr lang="en-US"/>
           </a:p>
@@ -1102,7 +1103,7 @@
             <a:fld id="{8AECDF24-0F62-6442-A2C0-578570B09936}" type="datetimeFigureOut">
               <a:rPr lang="en-US" smtClean="0"/>
               <a:pPr/>
-              <a:t>4/4/2020</a:t>
+              <a:t>4/7/2020</a:t>
             </a:fld>
             <a:endParaRPr lang="en-US"/>
           </a:p>
@@ -1319,7 +1320,7 @@
           <a:p>
             <a:fld id="{8AECDF24-0F62-6442-A2C0-578570B09936}" type="datetimeFigureOut">
               <a:rPr lang="en-US" smtClean="0"/>
-              <a:t>4/4/2020</a:t>
+              <a:t>4/7/2020</a:t>
             </a:fld>
             <a:endParaRPr lang="en-US"/>
           </a:p>
@@ -1527,7 +1528,7 @@
           <a:p>
             <a:fld id="{8AECDF24-0F62-6442-A2C0-578570B09936}" type="datetimeFigureOut">
               <a:rPr lang="en-US" smtClean="0"/>
-              <a:t>4/4/2020</a:t>
+              <a:t>4/7/2020</a:t>
             </a:fld>
             <a:endParaRPr lang="en-US"/>
           </a:p>
@@ -1764,7 +1765,7 @@
             <a:fld id="{8AECDF24-0F62-6442-A2C0-578570B09936}" type="datetimeFigureOut">
               <a:rPr lang="en-US" smtClean="0"/>
               <a:pPr/>
-              <a:t>4/4/2020</a:t>
+              <a:t>4/7/2020</a:t>
             </a:fld>
             <a:endParaRPr lang="en-US"/>
           </a:p>
@@ -2164,7 +2165,7 @@
             <a:fld id="{8AECDF24-0F62-6442-A2C0-578570B09936}" type="datetimeFigureOut">
               <a:rPr lang="en-US" smtClean="0"/>
               <a:pPr/>
-              <a:t>4/4/2020</a:t>
+              <a:t>4/7/2020</a:t>
             </a:fld>
             <a:endParaRPr lang="en-US"/>
           </a:p>
@@ -2442,7 +2443,7 @@
           <a:p>
             <a:fld id="{8AECDF24-0F62-6442-A2C0-578570B09936}" type="datetimeFigureOut">
               <a:rPr lang="en-US" smtClean="0"/>
-              <a:t>4/4/2020</a:t>
+              <a:t>4/7/2020</a:t>
             </a:fld>
             <a:endParaRPr lang="en-US"/>
           </a:p>
@@ -2956,7 +2957,7 @@
           <a:p>
             <a:fld id="{8AECDF24-0F62-6442-A2C0-578570B09936}" type="datetimeFigureOut">
               <a:rPr lang="en-US" smtClean="0"/>
-              <a:t>4/4/2020</a:t>
+              <a:t>4/7/2020</a:t>
             </a:fld>
             <a:endParaRPr lang="en-US"/>
           </a:p>
@@ -3097,7 +3098,7 @@
           <a:p>
             <a:fld id="{8AECDF24-0F62-6442-A2C0-578570B09936}" type="datetimeFigureOut">
               <a:rPr lang="en-US" smtClean="0"/>
-              <a:t>4/4/2020</a:t>
+              <a:t>4/7/2020</a:t>
             </a:fld>
             <a:endParaRPr lang="en-US"/>
           </a:p>
@@ -3210,7 +3211,7 @@
           <a:p>
             <a:fld id="{8AECDF24-0F62-6442-A2C0-578570B09936}" type="datetimeFigureOut">
               <a:rPr lang="en-US" smtClean="0"/>
-              <a:t>4/4/2020</a:t>
+              <a:t>4/7/2020</a:t>
             </a:fld>
             <a:endParaRPr lang="en-US"/>
           </a:p>
@@ -3521,7 +3522,7 @@
           <a:p>
             <a:fld id="{8AECDF24-0F62-6442-A2C0-578570B09936}" type="datetimeFigureOut">
               <a:rPr lang="en-US" smtClean="0"/>
-              <a:t>4/4/2020</a:t>
+              <a:t>4/7/2020</a:t>
             </a:fld>
             <a:endParaRPr lang="en-US"/>
           </a:p>
@@ -3809,7 +3810,7 @@
           <a:p>
             <a:fld id="{8AECDF24-0F62-6442-A2C0-578570B09936}" type="datetimeFigureOut">
               <a:rPr lang="en-US" smtClean="0"/>
-              <a:t>4/4/2020</a:t>
+              <a:t>4/7/2020</a:t>
             </a:fld>
             <a:endParaRPr lang="en-US"/>
           </a:p>
@@ -4050,7 +4051,7 @@
           <a:p>
             <a:fld id="{8AECDF24-0F62-6442-A2C0-578570B09936}" type="datetimeFigureOut">
               <a:rPr lang="en-US" smtClean="0"/>
-              <a:t>4/4/2020</a:t>
+              <a:t>4/7/2020</a:t>
             </a:fld>
             <a:endParaRPr lang="en-US"/>
           </a:p>
@@ -4970,20 +4971,47 @@
         </p:nvSpPr>
         <p:spPr/>
         <p:txBody>
-          <a:bodyPr/>
+          <a:bodyPr>
+            <a:normAutofit lnSpcReduction="10000"/>
+          </a:bodyPr>
           <a:lstStyle/>
           <a:p>
             <a:r>
               <a:rPr lang="en-US" dirty="0"/>
-              <a:t>Liters Alcohol per Capita</a:t>
-            </a:r>
-          </a:p>
-          <a:p>
-            <a:r>
-              <a:rPr lang="en-US" dirty="0" err="1"/>
-              <a:t>qqSam</a:t>
-            </a:r>
-            <a:endParaRPr lang="en-US" dirty="0"/>
+              <a:t>Liters of Pure Alcohol Consumed per Capita per Year</a:t>
+            </a:r>
+          </a:p>
+          <a:p>
+            <a:r>
+              <a:rPr lang="en-US" dirty="0"/>
+              <a:t>Data gathered from World Health Organization’s (WHO) Substance Abuse Country Profiles</a:t>
+            </a:r>
+          </a:p>
+          <a:p>
+            <a:r>
+              <a:rPr lang="en-US" dirty="0"/>
+              <a:t>Harmful use of alcohol is among the major risk factors for suicide</a:t>
+            </a:r>
+          </a:p>
+          <a:p>
+            <a:r>
+              <a:rPr lang="en-US" dirty="0"/>
+              <a:t>Risk of suicidal ideation, suicidal attempts and completed suicide are each increased by 2–3 times among those with Alcohol Use Disorders (AUD) </a:t>
+            </a:r>
+          </a:p>
+          <a:p>
+            <a:r>
+              <a:rPr lang="en-US" dirty="0"/>
+              <a:t>A study published in </a:t>
+            </a:r>
+            <a:r>
+              <a:rPr lang="en-US" b="1" dirty="0"/>
+              <a:t>The Lancet</a:t>
+            </a:r>
+            <a:r>
+              <a:rPr lang="en-US" dirty="0"/>
+              <a:t> found that global alcohol consumption saw an increase of about 70% from 1990 to 2017, going from about 21 billion liters of pure alcohol to 35.7 billion liters of pure alcohol</a:t>
+            </a:r>
           </a:p>
         </p:txBody>
       </p:sp>
@@ -5019,44 +5047,70 @@
       </p:grpSpPr>
       <p:sp>
         <p:nvSpPr>
-          <p:cNvPr id="4" name="Title 3">
-            <a:extLst>
-              <a:ext uri="{FF2B5EF4-FFF2-40B4-BE49-F238E27FC236}">
-                <a16:creationId xmlns:a16="http://schemas.microsoft.com/office/drawing/2014/main" id="{B9E80BC2-4589-4F4D-8C68-24FFC67D1426}"/>
-              </a:ext>
-            </a:extLst>
-          </p:cNvPr>
-          <p:cNvSpPr>
-            <a:spLocks noGrp="1"/>
-          </p:cNvSpPr>
-          <p:nvPr>
-            <p:ph type="ctrTitle"/>
+          <p:cNvPr id="2" name="Title 1">
+            <a:extLst>
+              <a:ext uri="{FF2B5EF4-FFF2-40B4-BE49-F238E27FC236}">
+                <a16:creationId xmlns:a16="http://schemas.microsoft.com/office/drawing/2014/main" id="{F9B986DE-63B1-413F-BFDD-A742A84AECE9}"/>
+              </a:ext>
+            </a:extLst>
+          </p:cNvPr>
+          <p:cNvSpPr>
+            <a:spLocks noGrp="1"/>
+          </p:cNvSpPr>
+          <p:nvPr>
+            <p:ph type="title"/>
           </p:nvPr>
         </p:nvSpPr>
         <p:spPr>
           <a:xfrm>
-            <a:off x="416859" y="1122363"/>
-            <a:ext cx="10838329" cy="2387600"/>
+            <a:off x="838200" y="365125"/>
+            <a:ext cx="10515600" cy="1325563"/>
           </a:xfrm>
         </p:spPr>
         <p:txBody>
-          <a:bodyPr>
-            <a:normAutofit/>
-          </a:bodyPr>
-          <a:lstStyle/>
-          <a:p>
-            <a:pPr algn="l"/>
-            <a:r>
-              <a:rPr lang="en-US" sz="3600" dirty="0"/>
-              <a:t>Regression Model</a:t>
-            </a:r>
-          </a:p>
-        </p:txBody>
-      </p:sp>
+          <a:bodyPr/>
+          <a:lstStyle/>
+          <a:p>
+            <a:r>
+              <a:rPr lang="en-US" dirty="0"/>
+              <a:t>Alcohol Consumption: continued</a:t>
+            </a:r>
+          </a:p>
+        </p:txBody>
+      </p:sp>
+      <p:pic>
+        <p:nvPicPr>
+          <p:cNvPr id="5" name="Content Placeholder 4" descr="A close up of a map&#10;&#10;Description automatically generated">
+            <a:extLst>
+              <a:ext uri="{FF2B5EF4-FFF2-40B4-BE49-F238E27FC236}">
+                <a16:creationId xmlns:a16="http://schemas.microsoft.com/office/drawing/2014/main" id="{9E69C644-BC05-4CB9-B6C2-BA9CD47A2C3F}"/>
+              </a:ext>
+            </a:extLst>
+          </p:cNvPr>
+          <p:cNvPicPr>
+            <a:picLocks noGrp="1" noChangeAspect="1"/>
+          </p:cNvPicPr>
+          <p:nvPr>
+            <p:ph idx="1"/>
+          </p:nvPr>
+        </p:nvPicPr>
+        <p:blipFill>
+          <a:blip r:embed="rId2"/>
+          <a:stretch>
+            <a:fillRect/>
+          </a:stretch>
+        </p:blipFill>
+        <p:spPr>
+          <a:xfrm>
+            <a:off x="1293081" y="1406769"/>
+            <a:ext cx="9605837" cy="5451231"/>
+          </a:xfrm>
+        </p:spPr>
+      </p:pic>
     </p:spTree>
     <p:extLst>
       <p:ext uri="{BB962C8B-B14F-4D97-AF65-F5344CB8AC3E}">
-        <p14:creationId xmlns:p14="http://schemas.microsoft.com/office/powerpoint/2010/main" val="2366447657"/>
+        <p14:creationId xmlns:p14="http://schemas.microsoft.com/office/powerpoint/2010/main" val="2893686387"/>
       </p:ext>
     </p:extLst>
   </p:cSld>
@@ -5085,69 +5139,44 @@
       </p:grpSpPr>
       <p:sp>
         <p:nvSpPr>
-          <p:cNvPr id="2" name="Title 1">
-            <a:extLst>
-              <a:ext uri="{FF2B5EF4-FFF2-40B4-BE49-F238E27FC236}">
-                <a16:creationId xmlns:a16="http://schemas.microsoft.com/office/drawing/2014/main" id="{E3D71C4E-63CB-4FE7-B972-B803D7679B03}"/>
-              </a:ext>
-            </a:extLst>
-          </p:cNvPr>
-          <p:cNvSpPr>
-            <a:spLocks noGrp="1"/>
-          </p:cNvSpPr>
-          <p:nvPr>
-            <p:ph type="title"/>
-          </p:nvPr>
-        </p:nvSpPr>
-        <p:spPr/>
-        <p:txBody>
-          <a:bodyPr/>
-          <a:lstStyle/>
-          <a:p>
-            <a:r>
-              <a:rPr lang="en-US" dirty="0"/>
-              <a:t>Model Creation</a:t>
-            </a:r>
-          </a:p>
-        </p:txBody>
-      </p:sp>
-      <p:sp>
-        <p:nvSpPr>
-          <p:cNvPr id="3" name="Content Placeholder 2">
-            <a:extLst>
-              <a:ext uri="{FF2B5EF4-FFF2-40B4-BE49-F238E27FC236}">
-                <a16:creationId xmlns:a16="http://schemas.microsoft.com/office/drawing/2014/main" id="{0E62FB0E-6CF7-48F8-8A90-0CDCAE26F087}"/>
-              </a:ext>
-            </a:extLst>
-          </p:cNvPr>
-          <p:cNvSpPr>
-            <a:spLocks noGrp="1"/>
-          </p:cNvSpPr>
-          <p:nvPr>
-            <p:ph idx="1"/>
-          </p:nvPr>
-        </p:nvSpPr>
-        <p:spPr/>
-        <p:txBody>
-          <a:bodyPr/>
-          <a:lstStyle/>
-          <a:p>
-            <a:pPr fontAlgn="base"/>
-            <a:r>
-              <a:rPr lang="en-US" dirty="0" err="1"/>
-              <a:t>qqOsman</a:t>
-            </a:r>
-            <a:endParaRPr lang="en-US" dirty="0"/>
-          </a:p>
-          <a:p>
-            <a:endParaRPr lang="en-US" dirty="0"/>
+          <p:cNvPr id="4" name="Title 3">
+            <a:extLst>
+              <a:ext uri="{FF2B5EF4-FFF2-40B4-BE49-F238E27FC236}">
+                <a16:creationId xmlns:a16="http://schemas.microsoft.com/office/drawing/2014/main" id="{B9E80BC2-4589-4F4D-8C68-24FFC67D1426}"/>
+              </a:ext>
+            </a:extLst>
+          </p:cNvPr>
+          <p:cNvSpPr>
+            <a:spLocks noGrp="1"/>
+          </p:cNvSpPr>
+          <p:nvPr>
+            <p:ph type="ctrTitle"/>
+          </p:nvPr>
+        </p:nvSpPr>
+        <p:spPr>
+          <a:xfrm>
+            <a:off x="416859" y="1122363"/>
+            <a:ext cx="10838329" cy="2387600"/>
+          </a:xfrm>
+        </p:spPr>
+        <p:txBody>
+          <a:bodyPr>
+            <a:normAutofit/>
+          </a:bodyPr>
+          <a:lstStyle/>
+          <a:p>
+            <a:pPr algn="l"/>
+            <a:r>
+              <a:rPr lang="en-US" sz="3600" dirty="0"/>
+              <a:t>Regression Model</a:t>
+            </a:r>
           </a:p>
         </p:txBody>
       </p:sp>
     </p:spTree>
     <p:extLst>
       <p:ext uri="{BB962C8B-B14F-4D97-AF65-F5344CB8AC3E}">
-        <p14:creationId xmlns:p14="http://schemas.microsoft.com/office/powerpoint/2010/main" val="1998129388"/>
+        <p14:creationId xmlns:p14="http://schemas.microsoft.com/office/powerpoint/2010/main" val="2366447657"/>
       </p:ext>
     </p:extLst>
   </p:cSld>
@@ -5179,7 +5208,7 @@
           <p:cNvPr id="2" name="Title 1">
             <a:extLst>
               <a:ext uri="{FF2B5EF4-FFF2-40B4-BE49-F238E27FC236}">
-                <a16:creationId xmlns:a16="http://schemas.microsoft.com/office/drawing/2014/main" id="{797AEA03-72AA-4A62-9C5E-93A1D60018B1}"/>
+                <a16:creationId xmlns:a16="http://schemas.microsoft.com/office/drawing/2014/main" id="{E3D71C4E-63CB-4FE7-B972-B803D7679B03}"/>
               </a:ext>
             </a:extLst>
           </p:cNvPr>
@@ -5197,7 +5226,7 @@
           <a:p>
             <a:r>
               <a:rPr lang="en-US" dirty="0"/>
-              <a:t>Model Refinement</a:t>
+              <a:t>Model Creation</a:t>
             </a:r>
           </a:p>
         </p:txBody>
@@ -5207,7 +5236,7 @@
           <p:cNvPr id="3" name="Content Placeholder 2">
             <a:extLst>
               <a:ext uri="{FF2B5EF4-FFF2-40B4-BE49-F238E27FC236}">
-                <a16:creationId xmlns:a16="http://schemas.microsoft.com/office/drawing/2014/main" id="{0872993A-5D50-4F30-BA62-56A008497EB7}"/>
+                <a16:creationId xmlns:a16="http://schemas.microsoft.com/office/drawing/2014/main" id="{0E62FB0E-6CF7-48F8-8A90-0CDCAE26F087}"/>
               </a:ext>
             </a:extLst>
           </p:cNvPr>
@@ -5223,10 +5252,14 @@
           <a:bodyPr/>
           <a:lstStyle/>
           <a:p>
+            <a:pPr fontAlgn="base"/>
             <a:r>
               <a:rPr lang="en-US" dirty="0" err="1"/>
               <a:t>qqOsman</a:t>
             </a:r>
+            <a:endParaRPr lang="en-US" dirty="0"/>
+          </a:p>
+          <a:p>
             <a:endParaRPr lang="en-US" dirty="0"/>
           </a:p>
         </p:txBody>
@@ -5234,7 +5267,7 @@
     </p:spTree>
     <p:extLst>
       <p:ext uri="{BB962C8B-B14F-4D97-AF65-F5344CB8AC3E}">
-        <p14:creationId xmlns:p14="http://schemas.microsoft.com/office/powerpoint/2010/main" val="3407115648"/>
+        <p14:creationId xmlns:p14="http://schemas.microsoft.com/office/powerpoint/2010/main" val="1998129388"/>
       </p:ext>
     </p:extLst>
   </p:cSld>
@@ -5266,7 +5299,7 @@
           <p:cNvPr id="2" name="Title 1">
             <a:extLst>
               <a:ext uri="{FF2B5EF4-FFF2-40B4-BE49-F238E27FC236}">
-                <a16:creationId xmlns:a16="http://schemas.microsoft.com/office/drawing/2014/main" id="{1180966A-6DCE-45CB-B2B4-A4CB78B27016}"/>
+                <a16:creationId xmlns:a16="http://schemas.microsoft.com/office/drawing/2014/main" id="{797AEA03-72AA-4A62-9C5E-93A1D60018B1}"/>
               </a:ext>
             </a:extLst>
           </p:cNvPr>
@@ -5284,7 +5317,7 @@
           <a:p>
             <a:r>
               <a:rPr lang="en-US" dirty="0"/>
-              <a:t>Model Limitations</a:t>
+              <a:t>Model Refinement</a:t>
             </a:r>
           </a:p>
         </p:txBody>
@@ -5294,7 +5327,7 @@
           <p:cNvPr id="3" name="Content Placeholder 2">
             <a:extLst>
               <a:ext uri="{FF2B5EF4-FFF2-40B4-BE49-F238E27FC236}">
-                <a16:creationId xmlns:a16="http://schemas.microsoft.com/office/drawing/2014/main" id="{57574260-73D6-4C2F-B05F-DA8EA9C8CA88}"/>
+                <a16:creationId xmlns:a16="http://schemas.microsoft.com/office/drawing/2014/main" id="{0872993A-5D50-4F30-BA62-56A008497EB7}"/>
               </a:ext>
             </a:extLst>
           </p:cNvPr>
@@ -5321,7 +5354,7 @@
     </p:spTree>
     <p:extLst>
       <p:ext uri="{BB962C8B-B14F-4D97-AF65-F5344CB8AC3E}">
-        <p14:creationId xmlns:p14="http://schemas.microsoft.com/office/powerpoint/2010/main" val="1698259041"/>
+        <p14:creationId xmlns:p14="http://schemas.microsoft.com/office/powerpoint/2010/main" val="3407115648"/>
       </p:ext>
     </p:extLst>
   </p:cSld>
@@ -5353,7 +5386,7 @@
           <p:cNvPr id="2" name="Title 1">
             <a:extLst>
               <a:ext uri="{FF2B5EF4-FFF2-40B4-BE49-F238E27FC236}">
-                <a16:creationId xmlns:a16="http://schemas.microsoft.com/office/drawing/2014/main" id="{A58B4A80-B4DD-4EFB-80F6-CE4AED5F00B1}"/>
+                <a16:creationId xmlns:a16="http://schemas.microsoft.com/office/drawing/2014/main" id="{1180966A-6DCE-45CB-B2B4-A4CB78B27016}"/>
               </a:ext>
             </a:extLst>
           </p:cNvPr>
@@ -5371,7 +5404,7 @@
           <a:p>
             <a:r>
               <a:rPr lang="en-US" dirty="0"/>
-              <a:t>Model Outcomes</a:t>
+              <a:t>Model Limitations</a:t>
             </a:r>
           </a:p>
         </p:txBody>
@@ -5381,7 +5414,7 @@
           <p:cNvPr id="3" name="Content Placeholder 2">
             <a:extLst>
               <a:ext uri="{FF2B5EF4-FFF2-40B4-BE49-F238E27FC236}">
-                <a16:creationId xmlns:a16="http://schemas.microsoft.com/office/drawing/2014/main" id="{43DD36A2-8495-431F-83BA-B5F0C4C38CFB}"/>
+                <a16:creationId xmlns:a16="http://schemas.microsoft.com/office/drawing/2014/main" id="{57574260-73D6-4C2F-B05F-DA8EA9C8CA88}"/>
               </a:ext>
             </a:extLst>
           </p:cNvPr>
@@ -5408,7 +5441,7 @@
     </p:spTree>
     <p:extLst>
       <p:ext uri="{BB962C8B-B14F-4D97-AF65-F5344CB8AC3E}">
-        <p14:creationId xmlns:p14="http://schemas.microsoft.com/office/powerpoint/2010/main" val="202907545"/>
+        <p14:creationId xmlns:p14="http://schemas.microsoft.com/office/powerpoint/2010/main" val="1698259041"/>
       </p:ext>
     </p:extLst>
   </p:cSld>
@@ -5437,44 +5470,65 @@
       </p:grpSpPr>
       <p:sp>
         <p:nvSpPr>
-          <p:cNvPr id="4" name="Title 3">
-            <a:extLst>
-              <a:ext uri="{FF2B5EF4-FFF2-40B4-BE49-F238E27FC236}">
-                <a16:creationId xmlns:a16="http://schemas.microsoft.com/office/drawing/2014/main" id="{B9E80BC2-4589-4F4D-8C68-24FFC67D1426}"/>
-              </a:ext>
-            </a:extLst>
-          </p:cNvPr>
-          <p:cNvSpPr>
-            <a:spLocks noGrp="1"/>
-          </p:cNvSpPr>
-          <p:nvPr>
-            <p:ph type="ctrTitle"/>
-          </p:nvPr>
-        </p:nvSpPr>
-        <p:spPr>
-          <a:xfrm>
-            <a:off x="416859" y="1122363"/>
-            <a:ext cx="10838329" cy="2387600"/>
-          </a:xfrm>
-        </p:spPr>
-        <p:txBody>
-          <a:bodyPr>
-            <a:normAutofit/>
-          </a:bodyPr>
-          <a:lstStyle/>
-          <a:p>
-            <a:pPr algn="l"/>
-            <a:r>
-              <a:rPr lang="en-US" sz="3600" dirty="0"/>
-              <a:t>Research &amp; Data Analysis </a:t>
-            </a:r>
+          <p:cNvPr id="2" name="Title 1">
+            <a:extLst>
+              <a:ext uri="{FF2B5EF4-FFF2-40B4-BE49-F238E27FC236}">
+                <a16:creationId xmlns:a16="http://schemas.microsoft.com/office/drawing/2014/main" id="{A58B4A80-B4DD-4EFB-80F6-CE4AED5F00B1}"/>
+              </a:ext>
+            </a:extLst>
+          </p:cNvPr>
+          <p:cNvSpPr>
+            <a:spLocks noGrp="1"/>
+          </p:cNvSpPr>
+          <p:nvPr>
+            <p:ph type="title"/>
+          </p:nvPr>
+        </p:nvSpPr>
+        <p:spPr/>
+        <p:txBody>
+          <a:bodyPr/>
+          <a:lstStyle/>
+          <a:p>
+            <a:r>
+              <a:rPr lang="en-US" dirty="0"/>
+              <a:t>Model Outcomes</a:t>
+            </a:r>
+          </a:p>
+        </p:txBody>
+      </p:sp>
+      <p:sp>
+        <p:nvSpPr>
+          <p:cNvPr id="3" name="Content Placeholder 2">
+            <a:extLst>
+              <a:ext uri="{FF2B5EF4-FFF2-40B4-BE49-F238E27FC236}">
+                <a16:creationId xmlns:a16="http://schemas.microsoft.com/office/drawing/2014/main" id="{43DD36A2-8495-431F-83BA-B5F0C4C38CFB}"/>
+              </a:ext>
+            </a:extLst>
+          </p:cNvPr>
+          <p:cNvSpPr>
+            <a:spLocks noGrp="1"/>
+          </p:cNvSpPr>
+          <p:nvPr>
+            <p:ph idx="1"/>
+          </p:nvPr>
+        </p:nvSpPr>
+        <p:spPr/>
+        <p:txBody>
+          <a:bodyPr/>
+          <a:lstStyle/>
+          <a:p>
+            <a:r>
+              <a:rPr lang="en-US" dirty="0" err="1"/>
+              <a:t>qqOsman</a:t>
+            </a:r>
+            <a:endParaRPr lang="en-US" dirty="0"/>
           </a:p>
         </p:txBody>
       </p:sp>
     </p:spTree>
     <p:extLst>
       <p:ext uri="{BB962C8B-B14F-4D97-AF65-F5344CB8AC3E}">
-        <p14:creationId xmlns:p14="http://schemas.microsoft.com/office/powerpoint/2010/main" val="2442058615"/>
+        <p14:creationId xmlns:p14="http://schemas.microsoft.com/office/powerpoint/2010/main" val="202907545"/>
       </p:ext>
     </p:extLst>
   </p:cSld>
@@ -5503,88 +5557,36 @@
       </p:grpSpPr>
       <p:sp>
         <p:nvSpPr>
-          <p:cNvPr id="2" name="Title 1">
-            <a:extLst>
-              <a:ext uri="{FF2B5EF4-FFF2-40B4-BE49-F238E27FC236}">
-                <a16:creationId xmlns:a16="http://schemas.microsoft.com/office/drawing/2014/main" id="{624DC2CB-8BD0-C849-B52E-0F91A40C741E}"/>
-              </a:ext>
-            </a:extLst>
-          </p:cNvPr>
-          <p:cNvSpPr>
-            <a:spLocks noGrp="1"/>
-          </p:cNvSpPr>
-          <p:nvPr>
-            <p:ph type="title"/>
-          </p:nvPr>
-        </p:nvSpPr>
-        <p:spPr/>
-        <p:txBody>
-          <a:bodyPr/>
-          <a:lstStyle/>
-          <a:p>
-            <a:r>
-              <a:rPr lang="en-US" dirty="0"/>
-              <a:t>What Does the Data Tell Us?</a:t>
-            </a:r>
-          </a:p>
-        </p:txBody>
-      </p:sp>
-      <p:sp>
-        <p:nvSpPr>
-          <p:cNvPr id="3" name="Content Placeholder 2">
-            <a:extLst>
-              <a:ext uri="{FF2B5EF4-FFF2-40B4-BE49-F238E27FC236}">
-                <a16:creationId xmlns:a16="http://schemas.microsoft.com/office/drawing/2014/main" id="{399E939B-CD29-D445-B69B-5A724813DF0B}"/>
-              </a:ext>
-            </a:extLst>
-          </p:cNvPr>
-          <p:cNvSpPr>
-            <a:spLocks noGrp="1"/>
-          </p:cNvSpPr>
-          <p:nvPr>
-            <p:ph idx="1"/>
-          </p:nvPr>
-        </p:nvSpPr>
-        <p:spPr/>
-        <p:txBody>
-          <a:bodyPr/>
-          <a:lstStyle/>
-          <a:p>
-            <a:r>
-              <a:rPr lang="en-US" dirty="0"/>
-              <a:t>Sections:</a:t>
-            </a:r>
-          </a:p>
-          <a:p>
-            <a:endParaRPr lang="en-US" dirty="0"/>
-          </a:p>
-          <a:p>
-            <a:pPr lvl="1"/>
-            <a:r>
-              <a:rPr lang="en-US" dirty="0"/>
-              <a:t>Impact of Economic Indicators (GDP)</a:t>
-            </a:r>
-          </a:p>
-          <a:p>
-            <a:pPr lvl="1"/>
-            <a:endParaRPr lang="en-US" dirty="0"/>
-          </a:p>
-          <a:p>
-            <a:pPr lvl="1"/>
-            <a:r>
-              <a:rPr lang="en-US" dirty="0"/>
-              <a:t>Impact of Substance Abuse Indications (Alcohol Abuse)</a:t>
-            </a:r>
-          </a:p>
-          <a:p>
-            <a:pPr lvl="1"/>
-            <a:endParaRPr lang="en-US" dirty="0"/>
-          </a:p>
-          <a:p>
-            <a:pPr lvl="1"/>
-            <a:r>
-              <a:rPr lang="en-US" dirty="0"/>
-              <a:t>Impact of Mental Health Resources</a:t>
+          <p:cNvPr id="4" name="Title 3">
+            <a:extLst>
+              <a:ext uri="{FF2B5EF4-FFF2-40B4-BE49-F238E27FC236}">
+                <a16:creationId xmlns:a16="http://schemas.microsoft.com/office/drawing/2014/main" id="{B9E80BC2-4589-4F4D-8C68-24FFC67D1426}"/>
+              </a:ext>
+            </a:extLst>
+          </p:cNvPr>
+          <p:cNvSpPr>
+            <a:spLocks noGrp="1"/>
+          </p:cNvSpPr>
+          <p:nvPr>
+            <p:ph type="ctrTitle"/>
+          </p:nvPr>
+        </p:nvSpPr>
+        <p:spPr>
+          <a:xfrm>
+            <a:off x="416859" y="1122363"/>
+            <a:ext cx="10838329" cy="2387600"/>
+          </a:xfrm>
+        </p:spPr>
+        <p:txBody>
+          <a:bodyPr>
+            <a:normAutofit/>
+          </a:bodyPr>
+          <a:lstStyle/>
+          <a:p>
+            <a:pPr algn="l"/>
+            <a:r>
+              <a:rPr lang="en-US" sz="3600" dirty="0"/>
+              <a:t>Research &amp; Data Analysis </a:t>
             </a:r>
           </a:p>
         </p:txBody>
@@ -5592,7 +5594,7 @@
     </p:spTree>
     <p:extLst>
       <p:ext uri="{BB962C8B-B14F-4D97-AF65-F5344CB8AC3E}">
-        <p14:creationId xmlns:p14="http://schemas.microsoft.com/office/powerpoint/2010/main" val="182351577"/>
+        <p14:creationId xmlns:p14="http://schemas.microsoft.com/office/powerpoint/2010/main" val="2442058615"/>
       </p:ext>
     </p:extLst>
   </p:cSld>
@@ -6017,7 +6019,7 @@
         <p:spPr>
           <a:xfrm>
             <a:off x="3582562" y="4992576"/>
-            <a:ext cx="2345392" cy="1200329"/>
+            <a:ext cx="2345392" cy="1384995"/>
           </a:xfrm>
           <a:prstGeom prst="rect">
             <a:avLst/>
@@ -6032,7 +6034,7 @@
           <a:p>
             <a:r>
               <a:rPr lang="en-US" sz="1200" b="1" dirty="0"/>
-              <a:t>Sam LASTNAME </a:t>
+              <a:t>Sam Garcia </a:t>
             </a:r>
           </a:p>
           <a:p>
@@ -6044,7 +6046,15 @@
           <a:p>
             <a:r>
               <a:rPr lang="en-US" sz="1200" dirty="0"/>
-              <a:t>(Part-time - School of Math)</a:t>
+              <a:t>(Part-time - </a:t>
+            </a:r>
+            <a:r>
+              <a:rPr lang="en-US" sz="1200" dirty="0" err="1"/>
+              <a:t>ISyE</a:t>
+            </a:r>
+            <a:r>
+              <a:rPr lang="en-US" sz="1200" dirty="0"/>
+              <a:t>)</a:t>
             </a:r>
             <a:br>
               <a:rPr lang="en-US" sz="1200" dirty="0"/>
@@ -6054,13 +6064,13 @@
           <a:p>
             <a:r>
               <a:rPr lang="en-US" sz="1200" dirty="0"/>
-              <a:t>From Atlanta, GA</a:t>
+              <a:t>From San Juan, PR</a:t>
             </a:r>
           </a:p>
           <a:p>
             <a:r>
               <a:rPr lang="en-US" sz="1200" dirty="0"/>
-              <a:t>Hobbies: Running &amp; Board Games</a:t>
+              <a:t>Hobbies: Software Development and Linux</a:t>
             </a:r>
           </a:p>
         </p:txBody>
@@ -6315,7 +6325,7 @@
           <a:p>
             <a:r>
               <a:rPr lang="en-US" dirty="0"/>
-              <a:t>Impact of Wealth, Country Level Economic Indicators</a:t>
+              <a:t>What Does the Data Tell Us?</a:t>
             </a:r>
           </a:p>
         </p:txBody>
@@ -6343,55 +6353,47 @@
           <a:p>
             <a:r>
               <a:rPr lang="en-US" dirty="0"/>
-              <a:t>Exploratory Analysis - Visual</a:t>
+              <a:t>Sections:</a:t>
             </a:r>
           </a:p>
           <a:p>
             <a:endParaRPr lang="en-US" dirty="0"/>
           </a:p>
           <a:p>
+            <a:pPr lvl="1"/>
             <a:r>
               <a:rPr lang="en-US" dirty="0"/>
-              <a:t>Testing (Hypothesis etc.)</a:t>
-            </a:r>
-          </a:p>
-          <a:p>
+              <a:t>Impact of Economic Indicators (GDP)</a:t>
+            </a:r>
+          </a:p>
+          <a:p>
+            <a:pPr lvl="1"/>
             <a:endParaRPr lang="en-US" dirty="0"/>
           </a:p>
           <a:p>
-            <a:r>
-              <a:rPr lang="en-US" dirty="0" err="1"/>
-              <a:t>Elasiticity</a:t>
-            </a:r>
+            <a:pPr lvl="1"/>
             <a:r>
               <a:rPr lang="en-US" dirty="0"/>
-              <a:t>/impact on our outcome</a:t>
-            </a:r>
-          </a:p>
-          <a:p>
+              <a:t>Impact of Substance Abuse Indications (Alcohol Abuse)</a:t>
+            </a:r>
+          </a:p>
+          <a:p>
+            <a:pPr lvl="1"/>
             <a:endParaRPr lang="en-US" dirty="0"/>
           </a:p>
           <a:p>
+            <a:pPr lvl="1"/>
             <a:r>
               <a:rPr lang="en-US" dirty="0"/>
-              <a:t>What policy makers should know</a:t>
-            </a:r>
-          </a:p>
-          <a:p>
-            <a:endParaRPr lang="en-US" dirty="0"/>
-          </a:p>
-          <a:p>
-            <a:endParaRPr lang="en-US" dirty="0"/>
-          </a:p>
-          <a:p>
-            <a:endParaRPr lang="en-US" dirty="0"/>
+              <a:t>Impact of Mental Health Resources</a:t>
+            </a:r>
           </a:p>
         </p:txBody>
       </p:sp>
     </p:spTree>
     <p:extLst>
       <p:ext uri="{BB962C8B-B14F-4D97-AF65-F5344CB8AC3E}">
-        <p14:creationId xmlns:p14="http://schemas.microsoft.com/office/powerpoint/2010/main" val="1808011340"/>
+        <p14:creationId xmlns:p14="http://schemas.microsoft.com/office/powerpoint/2010/main" val="182351577"/>
       </p:ext>
     </p:extLst>
   </p:cSld>
@@ -6441,7 +6443,7 @@
           <a:p>
             <a:r>
               <a:rPr lang="en-US" dirty="0"/>
-              <a:t>Impact Alcohol Abuse</a:t>
+              <a:t>Impact of Wealth, Country Level Economic Indicators</a:t>
             </a:r>
           </a:p>
         </p:txBody>
@@ -6500,7 +6502,7 @@
           <a:p>
             <a:r>
               <a:rPr lang="en-US" dirty="0"/>
-              <a:t>What policy makers should know and do</a:t>
+              <a:t>What policy makers should know</a:t>
             </a:r>
           </a:p>
           <a:p>
@@ -6517,7 +6519,7 @@
     </p:spTree>
     <p:extLst>
       <p:ext uri="{BB962C8B-B14F-4D97-AF65-F5344CB8AC3E}">
-        <p14:creationId xmlns:p14="http://schemas.microsoft.com/office/powerpoint/2010/main" val="2733299390"/>
+        <p14:creationId xmlns:p14="http://schemas.microsoft.com/office/powerpoint/2010/main" val="1808011340"/>
       </p:ext>
     </p:extLst>
   </p:cSld>
@@ -6567,7 +6569,7 @@
           <a:p>
             <a:r>
               <a:rPr lang="en-US" dirty="0"/>
-              <a:t>Impact of Availability of Mental Health Resources</a:t>
+              <a:t>Impact Alcohol Abuse</a:t>
             </a:r>
           </a:p>
         </p:txBody>
@@ -6590,12 +6592,21 @@
         </p:nvSpPr>
         <p:spPr/>
         <p:txBody>
-          <a:bodyPr/>
+          <a:bodyPr>
+            <a:normAutofit fontScale="77500" lnSpcReduction="20000"/>
+          </a:bodyPr>
           <a:lstStyle/>
           <a:p>
             <a:r>
               <a:rPr lang="en-US" dirty="0"/>
-              <a:t>Exploratory Analysis - Visual</a:t>
+              <a:t>Exploratory Analysis – Visual</a:t>
+            </a:r>
+          </a:p>
+          <a:p>
+            <a:pPr lvl="1"/>
+            <a:r>
+              <a:rPr lang="en-US" dirty="0"/>
+              <a:t>An association exists between alcohol consumption and the rate of suicide.</a:t>
             </a:r>
           </a:p>
           <a:p>
@@ -6608,6 +6619,13 @@
             </a:r>
           </a:p>
           <a:p>
+            <a:pPr lvl="1"/>
+            <a:r>
+              <a:rPr lang="en-US" dirty="0"/>
+              <a:t>Countries with higher rates of alcohol consumption tend to have higher suicide rates. By reducing the amount of alcohol consumed, suicides will be reduced. </a:t>
+            </a:r>
+          </a:p>
+          <a:p>
             <a:endParaRPr lang="en-US" dirty="0"/>
           </a:p>
           <a:p>
@@ -6621,12 +6639,26 @@
             </a:r>
           </a:p>
           <a:p>
+            <a:pPr lvl="1"/>
+            <a:r>
+              <a:rPr lang="en-US" dirty="0"/>
+              <a:t>Each X-unit increase/decrease in liters of alcohol consumed per capita resulted in Y-unit increase/decrease in the rate of suicide per capita.</a:t>
+            </a:r>
+          </a:p>
+          <a:p>
             <a:endParaRPr lang="en-US" dirty="0"/>
           </a:p>
           <a:p>
             <a:r>
               <a:rPr lang="en-US" dirty="0"/>
-              <a:t>What policy makers should know</a:t>
+              <a:t>What policy makers should know and do</a:t>
+            </a:r>
+          </a:p>
+          <a:p>
+            <a:pPr lvl="1"/>
+            <a:r>
+              <a:rPr lang="en-US" dirty="0"/>
+              <a:t>Policy makers should consider implementing measures designed to mitigate the harmful use of alcohol as a means of reducing the rate of suicide.</a:t>
             </a:r>
           </a:p>
           <a:p>
@@ -6643,7 +6675,7 @@
     </p:spTree>
     <p:extLst>
       <p:ext uri="{BB962C8B-B14F-4D97-AF65-F5344CB8AC3E}">
-        <p14:creationId xmlns:p14="http://schemas.microsoft.com/office/powerpoint/2010/main" val="3553279853"/>
+        <p14:creationId xmlns:p14="http://schemas.microsoft.com/office/powerpoint/2010/main" val="2733299390"/>
       </p:ext>
     </p:extLst>
   </p:cSld>
@@ -6769,7 +6801,7 @@
     </p:spTree>
     <p:extLst>
       <p:ext uri="{BB962C8B-B14F-4D97-AF65-F5344CB8AC3E}">
-        <p14:creationId xmlns:p14="http://schemas.microsoft.com/office/powerpoint/2010/main" val="2745908012"/>
+        <p14:creationId xmlns:p14="http://schemas.microsoft.com/office/powerpoint/2010/main" val="3553279853"/>
       </p:ext>
     </p:extLst>
   </p:cSld>
@@ -6798,44 +6830,104 @@
       </p:grpSpPr>
       <p:sp>
         <p:nvSpPr>
-          <p:cNvPr id="4" name="Title 3">
-            <a:extLst>
-              <a:ext uri="{FF2B5EF4-FFF2-40B4-BE49-F238E27FC236}">
-                <a16:creationId xmlns:a16="http://schemas.microsoft.com/office/drawing/2014/main" id="{B9E80BC2-4589-4F4D-8C68-24FFC67D1426}"/>
-              </a:ext>
-            </a:extLst>
-          </p:cNvPr>
-          <p:cNvSpPr>
-            <a:spLocks noGrp="1"/>
-          </p:cNvSpPr>
-          <p:nvPr>
-            <p:ph type="ctrTitle"/>
-          </p:nvPr>
-        </p:nvSpPr>
-        <p:spPr>
-          <a:xfrm>
-            <a:off x="416859" y="1122363"/>
-            <a:ext cx="10838329" cy="2387600"/>
-          </a:xfrm>
-        </p:spPr>
-        <p:txBody>
-          <a:bodyPr>
-            <a:normAutofit/>
-          </a:bodyPr>
-          <a:lstStyle/>
-          <a:p>
-            <a:pPr algn="l"/>
-            <a:r>
-              <a:rPr lang="en-US" sz="3600" dirty="0"/>
-              <a:t>Recommendations &amp; Decision Making Support for Policy Makers (Prescriptive)</a:t>
-            </a:r>
+          <p:cNvPr id="2" name="Title 1">
+            <a:extLst>
+              <a:ext uri="{FF2B5EF4-FFF2-40B4-BE49-F238E27FC236}">
+                <a16:creationId xmlns:a16="http://schemas.microsoft.com/office/drawing/2014/main" id="{624DC2CB-8BD0-C849-B52E-0F91A40C741E}"/>
+              </a:ext>
+            </a:extLst>
+          </p:cNvPr>
+          <p:cNvSpPr>
+            <a:spLocks noGrp="1"/>
+          </p:cNvSpPr>
+          <p:nvPr>
+            <p:ph type="title"/>
+          </p:nvPr>
+        </p:nvSpPr>
+        <p:spPr/>
+        <p:txBody>
+          <a:bodyPr/>
+          <a:lstStyle/>
+          <a:p>
+            <a:r>
+              <a:rPr lang="en-US" dirty="0"/>
+              <a:t>Impact of Availability of Mental Health Resources</a:t>
+            </a:r>
+          </a:p>
+        </p:txBody>
+      </p:sp>
+      <p:sp>
+        <p:nvSpPr>
+          <p:cNvPr id="3" name="Content Placeholder 2">
+            <a:extLst>
+              <a:ext uri="{FF2B5EF4-FFF2-40B4-BE49-F238E27FC236}">
+                <a16:creationId xmlns:a16="http://schemas.microsoft.com/office/drawing/2014/main" id="{399E939B-CD29-D445-B69B-5A724813DF0B}"/>
+              </a:ext>
+            </a:extLst>
+          </p:cNvPr>
+          <p:cNvSpPr>
+            <a:spLocks noGrp="1"/>
+          </p:cNvSpPr>
+          <p:nvPr>
+            <p:ph idx="1"/>
+          </p:nvPr>
+        </p:nvSpPr>
+        <p:spPr/>
+        <p:txBody>
+          <a:bodyPr/>
+          <a:lstStyle/>
+          <a:p>
+            <a:r>
+              <a:rPr lang="en-US" dirty="0"/>
+              <a:t>Exploratory Analysis - Visual</a:t>
+            </a:r>
+          </a:p>
+          <a:p>
+            <a:endParaRPr lang="en-US" dirty="0"/>
+          </a:p>
+          <a:p>
+            <a:r>
+              <a:rPr lang="en-US" dirty="0"/>
+              <a:t>Testing (Hypothesis etc.)</a:t>
+            </a:r>
+          </a:p>
+          <a:p>
+            <a:endParaRPr lang="en-US" dirty="0"/>
+          </a:p>
+          <a:p>
+            <a:r>
+              <a:rPr lang="en-US" dirty="0" err="1"/>
+              <a:t>Elasiticity</a:t>
+            </a:r>
+            <a:r>
+              <a:rPr lang="en-US" dirty="0"/>
+              <a:t>/impact on our outcome</a:t>
+            </a:r>
+          </a:p>
+          <a:p>
+            <a:endParaRPr lang="en-US" dirty="0"/>
+          </a:p>
+          <a:p>
+            <a:r>
+              <a:rPr lang="en-US" dirty="0"/>
+              <a:t>What policy makers should know</a:t>
+            </a:r>
+          </a:p>
+          <a:p>
+            <a:endParaRPr lang="en-US" dirty="0"/>
+          </a:p>
+          <a:p>
+            <a:endParaRPr lang="en-US" dirty="0"/>
+          </a:p>
+          <a:p>
+            <a:endParaRPr lang="en-US" dirty="0"/>
           </a:p>
         </p:txBody>
       </p:sp>
     </p:spTree>
     <p:extLst>
       <p:ext uri="{BB962C8B-B14F-4D97-AF65-F5344CB8AC3E}">
-        <p14:creationId xmlns:p14="http://schemas.microsoft.com/office/powerpoint/2010/main" val="3276250105"/>
+        <p14:creationId xmlns:p14="http://schemas.microsoft.com/office/powerpoint/2010/main" val="2745908012"/>
       </p:ext>
     </p:extLst>
   </p:cSld>
@@ -6864,100 +6956,44 @@
       </p:grpSpPr>
       <p:sp>
         <p:nvSpPr>
-          <p:cNvPr id="2" name="Title 1">
-            <a:extLst>
-              <a:ext uri="{FF2B5EF4-FFF2-40B4-BE49-F238E27FC236}">
-                <a16:creationId xmlns:a16="http://schemas.microsoft.com/office/drawing/2014/main" id="{624DC2CB-8BD0-C849-B52E-0F91A40C741E}"/>
-              </a:ext>
-            </a:extLst>
-          </p:cNvPr>
-          <p:cNvSpPr>
-            <a:spLocks noGrp="1"/>
-          </p:cNvSpPr>
-          <p:nvPr>
-            <p:ph type="title"/>
-          </p:nvPr>
-        </p:nvSpPr>
-        <p:spPr/>
-        <p:txBody>
-          <a:bodyPr/>
-          <a:lstStyle/>
-          <a:p>
-            <a:r>
-              <a:rPr lang="en-US" dirty="0"/>
-              <a:t>What kind of Country Level Decision Making Support This Analysis Provides</a:t>
-            </a:r>
-          </a:p>
-        </p:txBody>
-      </p:sp>
-      <p:sp>
-        <p:nvSpPr>
-          <p:cNvPr id="3" name="Content Placeholder 2">
-            <a:extLst>
-              <a:ext uri="{FF2B5EF4-FFF2-40B4-BE49-F238E27FC236}">
-                <a16:creationId xmlns:a16="http://schemas.microsoft.com/office/drawing/2014/main" id="{399E939B-CD29-D445-B69B-5A724813DF0B}"/>
-              </a:ext>
-            </a:extLst>
-          </p:cNvPr>
-          <p:cNvSpPr>
-            <a:spLocks noGrp="1"/>
-          </p:cNvSpPr>
-          <p:nvPr>
-            <p:ph idx="1"/>
-          </p:nvPr>
-        </p:nvSpPr>
-        <p:spPr/>
-        <p:txBody>
-          <a:bodyPr/>
-          <a:lstStyle/>
-          <a:p>
-            <a:r>
-              <a:rPr lang="en-US" dirty="0"/>
-              <a:t>Justify investment and potential impact of decision making</a:t>
-            </a:r>
-          </a:p>
-          <a:p>
-            <a:endParaRPr lang="en-US" dirty="0"/>
-          </a:p>
-          <a:p>
-            <a:r>
-              <a:rPr lang="en-US" dirty="0"/>
-              <a:t>Bringing up statistics that would motivate decision makers</a:t>
-            </a:r>
-          </a:p>
-          <a:p>
-            <a:endParaRPr lang="en-US" dirty="0"/>
-          </a:p>
-          <a:p>
-            <a:r>
-              <a:rPr lang="en-US" dirty="0"/>
-              <a:t>Outlining a high-level strategy a country could take</a:t>
-            </a:r>
-          </a:p>
-          <a:p>
-            <a:endParaRPr lang="en-US" dirty="0"/>
-          </a:p>
-          <a:p>
-            <a:r>
-              <a:rPr lang="en-US" dirty="0"/>
-              <a:t>Highlighting where policy makers could invest in additional research to better understand the problem</a:t>
-            </a:r>
-          </a:p>
-          <a:p>
-            <a:endParaRPr lang="en-US" dirty="0"/>
-          </a:p>
-          <a:p>
-            <a:endParaRPr lang="en-US" dirty="0"/>
-          </a:p>
-          <a:p>
-            <a:endParaRPr lang="en-US" dirty="0"/>
+          <p:cNvPr id="4" name="Title 3">
+            <a:extLst>
+              <a:ext uri="{FF2B5EF4-FFF2-40B4-BE49-F238E27FC236}">
+                <a16:creationId xmlns:a16="http://schemas.microsoft.com/office/drawing/2014/main" id="{B9E80BC2-4589-4F4D-8C68-24FFC67D1426}"/>
+              </a:ext>
+            </a:extLst>
+          </p:cNvPr>
+          <p:cNvSpPr>
+            <a:spLocks noGrp="1"/>
+          </p:cNvSpPr>
+          <p:nvPr>
+            <p:ph type="ctrTitle"/>
+          </p:nvPr>
+        </p:nvSpPr>
+        <p:spPr>
+          <a:xfrm>
+            <a:off x="416859" y="1122363"/>
+            <a:ext cx="10838329" cy="2387600"/>
+          </a:xfrm>
+        </p:spPr>
+        <p:txBody>
+          <a:bodyPr>
+            <a:normAutofit/>
+          </a:bodyPr>
+          <a:lstStyle/>
+          <a:p>
+            <a:pPr algn="l"/>
+            <a:r>
+              <a:rPr lang="en-US" sz="3600" dirty="0"/>
+              <a:t>Recommendations &amp; Decision Making Support for Policy Makers (Prescriptive)</a:t>
+            </a:r>
           </a:p>
         </p:txBody>
       </p:sp>
     </p:spTree>
     <p:extLst>
       <p:ext uri="{BB962C8B-B14F-4D97-AF65-F5344CB8AC3E}">
-        <p14:creationId xmlns:p14="http://schemas.microsoft.com/office/powerpoint/2010/main" val="19698530"/>
+        <p14:creationId xmlns:p14="http://schemas.microsoft.com/office/powerpoint/2010/main" val="3276250105"/>
       </p:ext>
     </p:extLst>
   </p:cSld>
@@ -6986,6 +7022,128 @@
       </p:grpSpPr>
       <p:sp>
         <p:nvSpPr>
+          <p:cNvPr id="2" name="Title 1">
+            <a:extLst>
+              <a:ext uri="{FF2B5EF4-FFF2-40B4-BE49-F238E27FC236}">
+                <a16:creationId xmlns:a16="http://schemas.microsoft.com/office/drawing/2014/main" id="{624DC2CB-8BD0-C849-B52E-0F91A40C741E}"/>
+              </a:ext>
+            </a:extLst>
+          </p:cNvPr>
+          <p:cNvSpPr>
+            <a:spLocks noGrp="1"/>
+          </p:cNvSpPr>
+          <p:nvPr>
+            <p:ph type="title"/>
+          </p:nvPr>
+        </p:nvSpPr>
+        <p:spPr/>
+        <p:txBody>
+          <a:bodyPr/>
+          <a:lstStyle/>
+          <a:p>
+            <a:r>
+              <a:rPr lang="en-US" dirty="0"/>
+              <a:t>What kind of Country Level Decision Making Support This Analysis Provides</a:t>
+            </a:r>
+          </a:p>
+        </p:txBody>
+      </p:sp>
+      <p:sp>
+        <p:nvSpPr>
+          <p:cNvPr id="3" name="Content Placeholder 2">
+            <a:extLst>
+              <a:ext uri="{FF2B5EF4-FFF2-40B4-BE49-F238E27FC236}">
+                <a16:creationId xmlns:a16="http://schemas.microsoft.com/office/drawing/2014/main" id="{399E939B-CD29-D445-B69B-5A724813DF0B}"/>
+              </a:ext>
+            </a:extLst>
+          </p:cNvPr>
+          <p:cNvSpPr>
+            <a:spLocks noGrp="1"/>
+          </p:cNvSpPr>
+          <p:nvPr>
+            <p:ph idx="1"/>
+          </p:nvPr>
+        </p:nvSpPr>
+        <p:spPr/>
+        <p:txBody>
+          <a:bodyPr/>
+          <a:lstStyle/>
+          <a:p>
+            <a:r>
+              <a:rPr lang="en-US" dirty="0"/>
+              <a:t>Justify investment and potential impact of decision making</a:t>
+            </a:r>
+          </a:p>
+          <a:p>
+            <a:endParaRPr lang="en-US" dirty="0"/>
+          </a:p>
+          <a:p>
+            <a:r>
+              <a:rPr lang="en-US" dirty="0"/>
+              <a:t>Bringing up statistics that would motivate decision makers</a:t>
+            </a:r>
+          </a:p>
+          <a:p>
+            <a:endParaRPr lang="en-US" dirty="0"/>
+          </a:p>
+          <a:p>
+            <a:r>
+              <a:rPr lang="en-US" dirty="0"/>
+              <a:t>Outlining a high-level strategy a country could take</a:t>
+            </a:r>
+          </a:p>
+          <a:p>
+            <a:endParaRPr lang="en-US" dirty="0"/>
+          </a:p>
+          <a:p>
+            <a:r>
+              <a:rPr lang="en-US" dirty="0"/>
+              <a:t>Highlighting where policy makers could invest in additional research to better understand the problem</a:t>
+            </a:r>
+          </a:p>
+          <a:p>
+            <a:endParaRPr lang="en-US" dirty="0"/>
+          </a:p>
+          <a:p>
+            <a:endParaRPr lang="en-US" dirty="0"/>
+          </a:p>
+          <a:p>
+            <a:endParaRPr lang="en-US" dirty="0"/>
+          </a:p>
+        </p:txBody>
+      </p:sp>
+    </p:spTree>
+    <p:extLst>
+      <p:ext uri="{BB962C8B-B14F-4D97-AF65-F5344CB8AC3E}">
+        <p14:creationId xmlns:p14="http://schemas.microsoft.com/office/powerpoint/2010/main" val="19698530"/>
+      </p:ext>
+    </p:extLst>
+  </p:cSld>
+  <p:clrMapOvr>
+    <a:masterClrMapping/>
+  </p:clrMapOvr>
+</p:sld>
+</file>
+
+<file path=ppt/slides/slide27.xml><?xml version="1.0" encoding="utf-8"?>
+<p:sld xmlns:a="http://schemas.openxmlformats.org/drawingml/2006/main" xmlns:r="http://schemas.openxmlformats.org/officeDocument/2006/relationships" xmlns:p="http://schemas.openxmlformats.org/presentationml/2006/main">
+  <p:cSld>
+    <p:spTree>
+      <p:nvGrpSpPr>
+        <p:cNvPr id="1" name=""/>
+        <p:cNvGrpSpPr/>
+        <p:nvPr/>
+      </p:nvGrpSpPr>
+      <p:grpSpPr>
+        <a:xfrm>
+          <a:off x="0" y="0"/>
+          <a:ext cx="0" cy="0"/>
+          <a:chOff x="0" y="0"/>
+          <a:chExt cx="0" cy="0"/>
+        </a:xfrm>
+      </p:grpSpPr>
+      <p:sp>
+        <p:nvSpPr>
           <p:cNvPr id="4" name="Title 3">
             <a:extLst>
               <a:ext uri="{FF2B5EF4-FFF2-40B4-BE49-F238E27FC236}">
@@ -7033,7 +7191,7 @@
 </p:sld>
 </file>
 
-<file path=ppt/slides/slide27.xml><?xml version="1.0" encoding="utf-8"?>
+<file path=ppt/slides/slide28.xml><?xml version="1.0" encoding="utf-8"?>
 <p:sld xmlns:a="http://schemas.openxmlformats.org/drawingml/2006/main" xmlns:r="http://schemas.openxmlformats.org/officeDocument/2006/relationships" xmlns:p="http://schemas.openxmlformats.org/presentationml/2006/main">
   <p:cSld>
     <p:spTree>
@@ -7178,7 +7336,7 @@
           <a:p>
             <a:r>
               <a:rPr lang="en-US" dirty="0"/>
-              <a:t>The possibility of prevention and the scale of the problem highlight the need for policy makers, at the national level, to understand the factors that contribute to suicide not only in their </a:t>
+              <a:t>The possibility of prevention and the scale of the problem highlight the need for policy makers, at the national level, to understand the factors that contribute to suicide not only in their respective countries but also in neighboring countries</a:t>
             </a:r>
           </a:p>
           <a:p>
@@ -7625,14 +7783,14 @@
           <p:nvPr>
             <p:extLst>
               <p:ext uri="{D42A27DB-BD31-4B8C-83A1-F6EECF244321}">
-                <p14:modId xmlns:p14="http://schemas.microsoft.com/office/powerpoint/2010/main" val="673239336"/>
+                <p14:modId xmlns:p14="http://schemas.microsoft.com/office/powerpoint/2010/main" val="2009046471"/>
               </p:ext>
             </p:extLst>
           </p:nvPr>
         </p:nvGraphicFramePr>
         <p:xfrm>
           <a:off x="828336" y="1429879"/>
-          <a:ext cx="10525463" cy="4997555"/>
+          <a:ext cx="10525463" cy="5561221"/>
         </p:xfrm>
         <a:graphic>
           <a:graphicData uri="http://schemas.openxmlformats.org/drawingml/2006/table">
@@ -7900,10 +8058,9 @@
                     <a:lstStyle/>
                     <a:p>
                       <a:r>
-                        <a:rPr lang="en-US" sz="1400" dirty="0" err="1"/>
-                        <a:t>qqSam</a:t>
+                        <a:rPr lang="en-US" sz="1400" dirty="0"/>
+                        <a:t>Alcohol per capita consumption per year in liters of pure alcohol. Countries with higher rates of alcohol consumption tend to have higher suicide rates. By reducing the amount of alcohol consumed, suicides will be reduced.</a:t>
                       </a:r>
-                      <a:endParaRPr lang="en-US" sz="1400" dirty="0"/>
                     </a:p>
                   </a:txBody>
                   <a:tcPr/>
@@ -7913,7 +8070,7 @@
                     <a:bodyPr/>
                     <a:lstStyle/>
                     <a:p>
-                      <a:endParaRPr lang="en-US"/>
+                      <a:endParaRPr lang="en-US" dirty="0"/>
                     </a:p>
                   </a:txBody>
                   <a:tcPr/>

</xml_diff>

<commit_message>
Added Suicide Policy analysis
</commit_message>
<xml_diff>
--- a/presentation/Team-25.pptx
+++ b/presentation/Team-25.pptx
@@ -5,7 +5,7 @@
     <p:sldMasterId id="2147483950" r:id="rId1"/>
   </p:sldMasterIdLst>
   <p:notesMasterIdLst>
-    <p:notesMasterId r:id="rId37"/>
+    <p:notesMasterId r:id="rId38"/>
   </p:notesMasterIdLst>
   <p:sldIdLst>
     <p:sldId id="257" r:id="rId2"/>
@@ -18,31 +18,32 @@
     <p:sldId id="286" r:id="rId9"/>
     <p:sldId id="287" r:id="rId10"/>
     <p:sldId id="288" r:id="rId11"/>
-    <p:sldId id="289" r:id="rId12"/>
-    <p:sldId id="290" r:id="rId13"/>
-    <p:sldId id="295" r:id="rId14"/>
-    <p:sldId id="285" r:id="rId15"/>
-    <p:sldId id="291" r:id="rId16"/>
-    <p:sldId id="292" r:id="rId17"/>
-    <p:sldId id="293" r:id="rId18"/>
-    <p:sldId id="294" r:id="rId19"/>
-    <p:sldId id="284" r:id="rId20"/>
-    <p:sldId id="272" r:id="rId21"/>
-    <p:sldId id="273" r:id="rId22"/>
-    <p:sldId id="275" r:id="rId23"/>
-    <p:sldId id="276" r:id="rId24"/>
-    <p:sldId id="282" r:id="rId25"/>
-    <p:sldId id="277" r:id="rId26"/>
-    <p:sldId id="279" r:id="rId27"/>
-    <p:sldId id="278" r:id="rId28"/>
-    <p:sldId id="281" r:id="rId29"/>
-    <p:sldId id="296" r:id="rId30"/>
-    <p:sldId id="298" r:id="rId31"/>
-    <p:sldId id="297" r:id="rId32"/>
-    <p:sldId id="299" r:id="rId33"/>
-    <p:sldId id="300" r:id="rId34"/>
-    <p:sldId id="301" r:id="rId35"/>
-    <p:sldId id="302" r:id="rId36"/>
+    <p:sldId id="303" r:id="rId12"/>
+    <p:sldId id="289" r:id="rId13"/>
+    <p:sldId id="290" r:id="rId14"/>
+    <p:sldId id="295" r:id="rId15"/>
+    <p:sldId id="285" r:id="rId16"/>
+    <p:sldId id="291" r:id="rId17"/>
+    <p:sldId id="292" r:id="rId18"/>
+    <p:sldId id="293" r:id="rId19"/>
+    <p:sldId id="294" r:id="rId20"/>
+    <p:sldId id="284" r:id="rId21"/>
+    <p:sldId id="272" r:id="rId22"/>
+    <p:sldId id="273" r:id="rId23"/>
+    <p:sldId id="275" r:id="rId24"/>
+    <p:sldId id="276" r:id="rId25"/>
+    <p:sldId id="304" r:id="rId26"/>
+    <p:sldId id="277" r:id="rId27"/>
+    <p:sldId id="279" r:id="rId28"/>
+    <p:sldId id="278" r:id="rId29"/>
+    <p:sldId id="281" r:id="rId30"/>
+    <p:sldId id="296" r:id="rId31"/>
+    <p:sldId id="298" r:id="rId32"/>
+    <p:sldId id="297" r:id="rId33"/>
+    <p:sldId id="299" r:id="rId34"/>
+    <p:sldId id="300" r:id="rId35"/>
+    <p:sldId id="301" r:id="rId36"/>
+    <p:sldId id="302" r:id="rId37"/>
   </p:sldIdLst>
   <p:sldSz cx="12192000" cy="6858000"/>
   <p:notesSz cx="6858000" cy="9144000"/>
@@ -231,7 +232,7 @@
           <a:p>
             <a:fld id="{5D44D6BF-B9BD-4338-90A3-91B6768E1A15}" type="datetimeFigureOut">
               <a:rPr lang="en-US" smtClean="0"/>
-              <a:t>4/10/2020</a:t>
+              <a:t>4/11/2020</a:t>
             </a:fld>
             <a:endParaRPr lang="en-US"/>
           </a:p>
@@ -935,6 +936,132 @@
 </p:notes>
 </file>
 
+<file path=ppt/notesSlides/notesSlide3.xml><?xml version="1.0" encoding="utf-8"?>
+<p:notes xmlns:a="http://schemas.openxmlformats.org/drawingml/2006/main" xmlns:r="http://schemas.openxmlformats.org/officeDocument/2006/relationships" xmlns:p="http://schemas.openxmlformats.org/presentationml/2006/main">
+  <p:cSld>
+    <p:spTree>
+      <p:nvGrpSpPr>
+        <p:cNvPr id="1" name=""/>
+        <p:cNvGrpSpPr/>
+        <p:nvPr/>
+      </p:nvGrpSpPr>
+      <p:grpSpPr>
+        <a:xfrm>
+          <a:off x="0" y="0"/>
+          <a:ext cx="0" cy="0"/>
+          <a:chOff x="0" y="0"/>
+          <a:chExt cx="0" cy="0"/>
+        </a:xfrm>
+      </p:grpSpPr>
+      <p:sp>
+        <p:nvSpPr>
+          <p:cNvPr id="2" name="Slide Image Placeholder 1"/>
+          <p:cNvSpPr>
+            <a:spLocks noGrp="1" noRot="1" noChangeAspect="1"/>
+          </p:cNvSpPr>
+          <p:nvPr>
+            <p:ph type="sldImg"/>
+          </p:nvPr>
+        </p:nvSpPr>
+        <p:spPr/>
+      </p:sp>
+      <p:sp>
+        <p:nvSpPr>
+          <p:cNvPr id="3" name="Notes Placeholder 2"/>
+          <p:cNvSpPr>
+            <a:spLocks noGrp="1"/>
+          </p:cNvSpPr>
+          <p:nvPr>
+            <p:ph type="body" idx="1"/>
+          </p:nvPr>
+        </p:nvSpPr>
+        <p:spPr/>
+        <p:txBody>
+          <a:bodyPr/>
+          <a:lstStyle/>
+          <a:p>
+            <a:pPr marL="0" marR="0" lvl="0" indent="0" algn="l" defTabSz="914400" rtl="0" eaLnBrk="1" fontAlgn="auto" latinLnBrk="0" hangingPunct="1">
+              <a:lnSpc>
+                <a:spcPct val="100000"/>
+              </a:lnSpc>
+              <a:spcBef>
+                <a:spcPts val="0"/>
+              </a:spcBef>
+              <a:spcAft>
+                <a:spcPts val="0"/>
+              </a:spcAft>
+              <a:buClrTx/>
+              <a:buSzTx/>
+              <a:buFontTx/>
+              <a:buNone/>
+              <a:tabLst/>
+              <a:defRPr/>
+            </a:pPr>
+            <a:r>
+              <a:rPr lang="en-US" sz="1200" kern="1200" dirty="0">
+                <a:solidFill>
+                  <a:schemeClr val="tx1"/>
+                </a:solidFill>
+                <a:effectLst/>
+                <a:latin typeface="+mn-lt"/>
+                <a:ea typeface="+mn-ea"/>
+                <a:cs typeface="+mn-cs"/>
+              </a:rPr>
+              <a:t>[1] </a:t>
+            </a:r>
+            <a:r>
+              <a:rPr lang="en-US" sz="1200" u="sng" kern="1200" dirty="0">
+                <a:solidFill>
+                  <a:schemeClr val="tx1"/>
+                </a:solidFill>
+                <a:effectLst/>
+                <a:latin typeface="+mn-lt"/>
+                <a:ea typeface="+mn-ea"/>
+                <a:cs typeface="+mn-cs"/>
+                <a:hlinkClick r:id="rId3"/>
+              </a:rPr>
+              <a:t>https://apps.who.int/iris/rest/bitstreams/1174021/retrieve</a:t>
+            </a:r>
+            <a:endParaRPr lang="en-US" dirty="0"/>
+          </a:p>
+        </p:txBody>
+      </p:sp>
+      <p:sp>
+        <p:nvSpPr>
+          <p:cNvPr id="4" name="Slide Number Placeholder 3"/>
+          <p:cNvSpPr>
+            <a:spLocks noGrp="1"/>
+          </p:cNvSpPr>
+          <p:nvPr>
+            <p:ph type="sldNum" sz="quarter" idx="5"/>
+          </p:nvPr>
+        </p:nvSpPr>
+        <p:spPr/>
+        <p:txBody>
+          <a:bodyPr/>
+          <a:lstStyle/>
+          <a:p>
+            <a:fld id="{56B17D78-F1C7-4592-8843-493934A58F74}" type="slidenum">
+              <a:rPr lang="en-US" smtClean="0"/>
+              <a:t>11</a:t>
+            </a:fld>
+            <a:endParaRPr lang="en-US"/>
+          </a:p>
+        </p:txBody>
+      </p:sp>
+    </p:spTree>
+    <p:extLst>
+      <p:ext uri="{BB962C8B-B14F-4D97-AF65-F5344CB8AC3E}">
+        <p14:creationId xmlns:p14="http://schemas.microsoft.com/office/powerpoint/2010/main" val="2653735793"/>
+      </p:ext>
+    </p:extLst>
+  </p:cSld>
+  <p:clrMapOvr>
+    <a:masterClrMapping/>
+  </p:clrMapOvr>
+</p:notes>
+</file>
+
 <file path=ppt/slideLayouts/slideLayout1.xml><?xml version="1.0" encoding="utf-8"?>
 <p:sldLayout xmlns:a="http://schemas.openxmlformats.org/drawingml/2006/main" xmlns:r="http://schemas.openxmlformats.org/officeDocument/2006/relationships" xmlns:p="http://schemas.openxmlformats.org/presentationml/2006/main" type="title" preserve="1">
   <p:cSld name="Title Slide">
@@ -1110,7 +1237,7 @@
             <a:fld id="{8AECDF24-0F62-6442-A2C0-578570B09936}" type="datetimeFigureOut">
               <a:rPr lang="en-US" smtClean="0"/>
               <a:pPr/>
-              <a:t>4/10/2020</a:t>
+              <a:t>4/11/2020</a:t>
             </a:fld>
             <a:endParaRPr lang="en-US"/>
           </a:p>
@@ -1327,7 +1454,7 @@
           <a:p>
             <a:fld id="{8AECDF24-0F62-6442-A2C0-578570B09936}" type="datetimeFigureOut">
               <a:rPr lang="en-US" smtClean="0"/>
-              <a:t>4/10/2020</a:t>
+              <a:t>4/11/2020</a:t>
             </a:fld>
             <a:endParaRPr lang="en-US"/>
           </a:p>
@@ -1535,7 +1662,7 @@
           <a:p>
             <a:fld id="{8AECDF24-0F62-6442-A2C0-578570B09936}" type="datetimeFigureOut">
               <a:rPr lang="en-US" smtClean="0"/>
-              <a:t>4/10/2020</a:t>
+              <a:t>4/11/2020</a:t>
             </a:fld>
             <a:endParaRPr lang="en-US"/>
           </a:p>
@@ -1772,7 +1899,7 @@
             <a:fld id="{8AECDF24-0F62-6442-A2C0-578570B09936}" type="datetimeFigureOut">
               <a:rPr lang="en-US" smtClean="0"/>
               <a:pPr/>
-              <a:t>4/10/2020</a:t>
+              <a:t>4/11/2020</a:t>
             </a:fld>
             <a:endParaRPr lang="en-US"/>
           </a:p>
@@ -2172,7 +2299,7 @@
             <a:fld id="{8AECDF24-0F62-6442-A2C0-578570B09936}" type="datetimeFigureOut">
               <a:rPr lang="en-US" smtClean="0"/>
               <a:pPr/>
-              <a:t>4/10/2020</a:t>
+              <a:t>4/11/2020</a:t>
             </a:fld>
             <a:endParaRPr lang="en-US"/>
           </a:p>
@@ -2450,7 +2577,7 @@
           <a:p>
             <a:fld id="{8AECDF24-0F62-6442-A2C0-578570B09936}" type="datetimeFigureOut">
               <a:rPr lang="en-US" smtClean="0"/>
-              <a:t>4/10/2020</a:t>
+              <a:t>4/11/2020</a:t>
             </a:fld>
             <a:endParaRPr lang="en-US"/>
           </a:p>
@@ -2964,7 +3091,7 @@
           <a:p>
             <a:fld id="{8AECDF24-0F62-6442-A2C0-578570B09936}" type="datetimeFigureOut">
               <a:rPr lang="en-US" smtClean="0"/>
-              <a:t>4/10/2020</a:t>
+              <a:t>4/11/2020</a:t>
             </a:fld>
             <a:endParaRPr lang="en-US"/>
           </a:p>
@@ -3105,7 +3232,7 @@
           <a:p>
             <a:fld id="{8AECDF24-0F62-6442-A2C0-578570B09936}" type="datetimeFigureOut">
               <a:rPr lang="en-US" smtClean="0"/>
-              <a:t>4/10/2020</a:t>
+              <a:t>4/11/2020</a:t>
             </a:fld>
             <a:endParaRPr lang="en-US"/>
           </a:p>
@@ -3218,7 +3345,7 @@
           <a:p>
             <a:fld id="{8AECDF24-0F62-6442-A2C0-578570B09936}" type="datetimeFigureOut">
               <a:rPr lang="en-US" smtClean="0"/>
-              <a:t>4/10/2020</a:t>
+              <a:t>4/11/2020</a:t>
             </a:fld>
             <a:endParaRPr lang="en-US"/>
           </a:p>
@@ -3529,7 +3656,7 @@
           <a:p>
             <a:fld id="{8AECDF24-0F62-6442-A2C0-578570B09936}" type="datetimeFigureOut">
               <a:rPr lang="en-US" smtClean="0"/>
-              <a:t>4/10/2020</a:t>
+              <a:t>4/11/2020</a:t>
             </a:fld>
             <a:endParaRPr lang="en-US"/>
           </a:p>
@@ -3817,7 +3944,7 @@
           <a:p>
             <a:fld id="{8AECDF24-0F62-6442-A2C0-578570B09936}" type="datetimeFigureOut">
               <a:rPr lang="en-US" smtClean="0"/>
-              <a:t>4/10/2020</a:t>
+              <a:t>4/11/2020</a:t>
             </a:fld>
             <a:endParaRPr lang="en-US"/>
           </a:p>
@@ -4058,7 +4185,7 @@
           <a:p>
             <a:fld id="{8AECDF24-0F62-6442-A2C0-578570B09936}" type="datetimeFigureOut">
               <a:rPr lang="en-US" smtClean="0"/>
-              <a:t>4/10/2020</a:t>
+              <a:t>4/11/2020</a:t>
             </a:fld>
             <a:endParaRPr lang="en-US"/>
           </a:p>
@@ -4752,6 +4879,165 @@
           <a:chExt cx="0" cy="0"/>
         </a:xfrm>
       </p:grpSpPr>
+      <p:pic>
+        <p:nvPicPr>
+          <p:cNvPr id="4" name="Picture 2" descr="Policies - Hill Havurah">
+            <a:extLst>
+              <a:ext uri="{FF2B5EF4-FFF2-40B4-BE49-F238E27FC236}">
+                <a16:creationId xmlns:a16="http://schemas.microsoft.com/office/drawing/2014/main" id="{7322F9A1-8741-4A13-B097-6AA6951FF3C7}"/>
+              </a:ext>
+            </a:extLst>
+          </p:cNvPr>
+          <p:cNvPicPr>
+            <a:picLocks noChangeAspect="1" noChangeArrowheads="1"/>
+          </p:cNvPicPr>
+          <p:nvPr/>
+        </p:nvPicPr>
+        <p:blipFill>
+          <a:blip r:embed="rId3">
+            <a:extLst>
+              <a:ext uri="{28A0092B-C50C-407E-A947-70E740481C1C}">
+                <a14:useLocalDpi xmlns:a14="http://schemas.microsoft.com/office/drawing/2010/main" val="0"/>
+              </a:ext>
+            </a:extLst>
+          </a:blip>
+          <a:srcRect/>
+          <a:stretch>
+            <a:fillRect/>
+          </a:stretch>
+        </p:blipFill>
+        <p:spPr bwMode="auto">
+          <a:xfrm>
+            <a:off x="9237826" y="5532436"/>
+            <a:ext cx="2397376" cy="1325563"/>
+          </a:xfrm>
+          <a:prstGeom prst="rect">
+            <a:avLst/>
+          </a:prstGeom>
+          <a:noFill/>
+          <a:extLst>
+            <a:ext uri="{909E8E84-426E-40DD-AFC4-6F175D3DCCD1}">
+              <a14:hiddenFill xmlns:a14="http://schemas.microsoft.com/office/drawing/2010/main">
+                <a:solidFill>
+                  <a:srgbClr val="FFFFFF"/>
+                </a:solidFill>
+              </a14:hiddenFill>
+            </a:ext>
+          </a:extLst>
+        </p:spPr>
+      </p:pic>
+      <p:sp>
+        <p:nvSpPr>
+          <p:cNvPr id="2" name="Title 1">
+            <a:extLst>
+              <a:ext uri="{FF2B5EF4-FFF2-40B4-BE49-F238E27FC236}">
+                <a16:creationId xmlns:a16="http://schemas.microsoft.com/office/drawing/2014/main" id="{5046D7FF-1F52-4ACD-BCEB-9816F9F94274}"/>
+              </a:ext>
+            </a:extLst>
+          </p:cNvPr>
+          <p:cNvSpPr>
+            <a:spLocks noGrp="1"/>
+          </p:cNvSpPr>
+          <p:nvPr>
+            <p:ph type="title"/>
+          </p:nvPr>
+        </p:nvSpPr>
+        <p:spPr/>
+        <p:txBody>
+          <a:bodyPr/>
+          <a:lstStyle/>
+          <a:p>
+            <a:r>
+              <a:rPr lang="en-US" dirty="0"/>
+              <a:t>Remaining Inputs: NSPS</a:t>
+            </a:r>
+          </a:p>
+        </p:txBody>
+      </p:sp>
+      <p:sp>
+        <p:nvSpPr>
+          <p:cNvPr id="3" name="Content Placeholder 2">
+            <a:extLst>
+              <a:ext uri="{FF2B5EF4-FFF2-40B4-BE49-F238E27FC236}">
+                <a16:creationId xmlns:a16="http://schemas.microsoft.com/office/drawing/2014/main" id="{AA9E6257-DED2-4591-958B-CB13AFD34262}"/>
+              </a:ext>
+            </a:extLst>
+          </p:cNvPr>
+          <p:cNvSpPr>
+            <a:spLocks noGrp="1"/>
+          </p:cNvSpPr>
+          <p:nvPr>
+            <p:ph idx="1"/>
+          </p:nvPr>
+        </p:nvSpPr>
+        <p:spPr/>
+        <p:txBody>
+          <a:bodyPr>
+            <a:normAutofit fontScale="92500"/>
+          </a:bodyPr>
+          <a:lstStyle/>
+          <a:p>
+            <a:r>
+              <a:rPr lang="en-US" dirty="0"/>
+              <a:t>Countries which have a National Suicide Prevention Strategy (NSPS)</a:t>
+            </a:r>
+          </a:p>
+          <a:p>
+            <a:r>
+              <a:rPr lang="en-US" dirty="0"/>
+              <a:t>Data retrieved from the UN report gathered from participating countries [1]</a:t>
+            </a:r>
+          </a:p>
+          <a:p>
+            <a:r>
+              <a:rPr lang="en-US" dirty="0"/>
+              <a:t>An implementation of a NSPS in Scotland called “Choose Live” decreased suicide rates by 20% over 10 years. [1]. </a:t>
+            </a:r>
+          </a:p>
+          <a:p>
+            <a:r>
+              <a:rPr lang="en-US" dirty="0"/>
+              <a:t>Since a WHO report on suicide prevention, the WHO has tracked a growing number of technical requests from countries on how to implement NSPSs. [1] </a:t>
+            </a:r>
+          </a:p>
+          <a:p>
+            <a:r>
+              <a:rPr lang="en-US" dirty="0"/>
+              <a:t>While government implementation of NSPSs may lead to a reduction in suicide, it may also be the cultural recognition of the issue by government, in addition to specific policy actions which decrease overall suicide. </a:t>
+            </a:r>
+          </a:p>
+        </p:txBody>
+      </p:sp>
+    </p:spTree>
+    <p:extLst>
+      <p:ext uri="{BB962C8B-B14F-4D97-AF65-F5344CB8AC3E}">
+        <p14:creationId xmlns:p14="http://schemas.microsoft.com/office/powerpoint/2010/main" val="2474529012"/>
+      </p:ext>
+    </p:extLst>
+  </p:cSld>
+  <p:clrMapOvr>
+    <a:masterClrMapping/>
+  </p:clrMapOvr>
+</p:sld>
+</file>
+
+<file path=ppt/slides/slide12.xml><?xml version="1.0" encoding="utf-8"?>
+<p:sld xmlns:a="http://schemas.openxmlformats.org/drawingml/2006/main" xmlns:r="http://schemas.openxmlformats.org/officeDocument/2006/relationships" xmlns:p="http://schemas.openxmlformats.org/presentationml/2006/main">
+  <p:cSld>
+    <p:spTree>
+      <p:nvGrpSpPr>
+        <p:cNvPr id="1" name=""/>
+        <p:cNvGrpSpPr/>
+        <p:nvPr/>
+      </p:nvGrpSpPr>
+      <p:grpSpPr>
+        <a:xfrm>
+          <a:off x="0" y="0"/>
+          <a:ext cx="0" cy="0"/>
+          <a:chOff x="0" y="0"/>
+          <a:chExt cx="0" cy="0"/>
+        </a:xfrm>
+      </p:grpSpPr>
       <p:sp>
         <p:nvSpPr>
           <p:cNvPr id="2" name="Title 1">
@@ -4915,7 +5201,7 @@
 </p:sld>
 </file>
 
-<file path=ppt/slides/slide12.xml><?xml version="1.0" encoding="utf-8"?>
+<file path=ppt/slides/slide13.xml><?xml version="1.0" encoding="utf-8"?>
 <p:sld xmlns:a="http://schemas.openxmlformats.org/drawingml/2006/main" xmlns:r="http://schemas.openxmlformats.org/officeDocument/2006/relationships" xmlns:p="http://schemas.openxmlformats.org/presentationml/2006/main">
   <p:cSld>
     <p:spTree>
@@ -5035,7 +5321,7 @@
 </p:sld>
 </file>
 
-<file path=ppt/slides/slide13.xml><?xml version="1.0" encoding="utf-8"?>
+<file path=ppt/slides/slide14.xml><?xml version="1.0" encoding="utf-8"?>
 <p:sld xmlns:a="http://schemas.openxmlformats.org/drawingml/2006/main" xmlns:r="http://schemas.openxmlformats.org/officeDocument/2006/relationships" xmlns:p="http://schemas.openxmlformats.org/presentationml/2006/main">
   <p:cSld>
     <p:spTree>
@@ -5127,72 +5413,6 @@
 </p:sld>
 </file>
 
-<file path=ppt/slides/slide14.xml><?xml version="1.0" encoding="utf-8"?>
-<p:sld xmlns:a="http://schemas.openxmlformats.org/drawingml/2006/main" xmlns:r="http://schemas.openxmlformats.org/officeDocument/2006/relationships" xmlns:p="http://schemas.openxmlformats.org/presentationml/2006/main">
-  <p:cSld>
-    <p:spTree>
-      <p:nvGrpSpPr>
-        <p:cNvPr id="1" name=""/>
-        <p:cNvGrpSpPr/>
-        <p:nvPr/>
-      </p:nvGrpSpPr>
-      <p:grpSpPr>
-        <a:xfrm>
-          <a:off x="0" y="0"/>
-          <a:ext cx="0" cy="0"/>
-          <a:chOff x="0" y="0"/>
-          <a:chExt cx="0" cy="0"/>
-        </a:xfrm>
-      </p:grpSpPr>
-      <p:sp>
-        <p:nvSpPr>
-          <p:cNvPr id="4" name="Title 3">
-            <a:extLst>
-              <a:ext uri="{FF2B5EF4-FFF2-40B4-BE49-F238E27FC236}">
-                <a16:creationId xmlns:a16="http://schemas.microsoft.com/office/drawing/2014/main" id="{B9E80BC2-4589-4F4D-8C68-24FFC67D1426}"/>
-              </a:ext>
-            </a:extLst>
-          </p:cNvPr>
-          <p:cNvSpPr>
-            <a:spLocks noGrp="1"/>
-          </p:cNvSpPr>
-          <p:nvPr>
-            <p:ph type="ctrTitle"/>
-          </p:nvPr>
-        </p:nvSpPr>
-        <p:spPr>
-          <a:xfrm>
-            <a:off x="416859" y="1122363"/>
-            <a:ext cx="10838329" cy="2387600"/>
-          </a:xfrm>
-        </p:spPr>
-        <p:txBody>
-          <a:bodyPr>
-            <a:normAutofit/>
-          </a:bodyPr>
-          <a:lstStyle/>
-          <a:p>
-            <a:pPr algn="l"/>
-            <a:r>
-              <a:rPr lang="en-US" sz="3600" dirty="0"/>
-              <a:t>Regression Model</a:t>
-            </a:r>
-          </a:p>
-        </p:txBody>
-      </p:sp>
-    </p:spTree>
-    <p:extLst>
-      <p:ext uri="{BB962C8B-B14F-4D97-AF65-F5344CB8AC3E}">
-        <p14:creationId xmlns:p14="http://schemas.microsoft.com/office/powerpoint/2010/main" val="2366447657"/>
-      </p:ext>
-    </p:extLst>
-  </p:cSld>
-  <p:clrMapOvr>
-    <a:masterClrMapping/>
-  </p:clrMapOvr>
-</p:sld>
-</file>
-
 <file path=ppt/slides/slide15.xml><?xml version="1.0" encoding="utf-8"?>
 <p:sld xmlns:a="http://schemas.openxmlformats.org/drawingml/2006/main" xmlns:r="http://schemas.openxmlformats.org/officeDocument/2006/relationships" xmlns:p="http://schemas.openxmlformats.org/presentationml/2006/main">
   <p:cSld>
@@ -5212,69 +5432,44 @@
       </p:grpSpPr>
       <p:sp>
         <p:nvSpPr>
-          <p:cNvPr id="2" name="Title 1">
-            <a:extLst>
-              <a:ext uri="{FF2B5EF4-FFF2-40B4-BE49-F238E27FC236}">
-                <a16:creationId xmlns:a16="http://schemas.microsoft.com/office/drawing/2014/main" id="{E3D71C4E-63CB-4FE7-B972-B803D7679B03}"/>
-              </a:ext>
-            </a:extLst>
-          </p:cNvPr>
-          <p:cNvSpPr>
-            <a:spLocks noGrp="1"/>
-          </p:cNvSpPr>
-          <p:nvPr>
-            <p:ph type="title"/>
-          </p:nvPr>
-        </p:nvSpPr>
-        <p:spPr/>
-        <p:txBody>
-          <a:bodyPr/>
-          <a:lstStyle/>
-          <a:p>
-            <a:r>
-              <a:rPr lang="en-US" dirty="0"/>
-              <a:t>Model Creation</a:t>
-            </a:r>
-          </a:p>
-        </p:txBody>
-      </p:sp>
-      <p:sp>
-        <p:nvSpPr>
-          <p:cNvPr id="3" name="Content Placeholder 2">
-            <a:extLst>
-              <a:ext uri="{FF2B5EF4-FFF2-40B4-BE49-F238E27FC236}">
-                <a16:creationId xmlns:a16="http://schemas.microsoft.com/office/drawing/2014/main" id="{0E62FB0E-6CF7-48F8-8A90-0CDCAE26F087}"/>
-              </a:ext>
-            </a:extLst>
-          </p:cNvPr>
-          <p:cNvSpPr>
-            <a:spLocks noGrp="1"/>
-          </p:cNvSpPr>
-          <p:nvPr>
-            <p:ph idx="1"/>
-          </p:nvPr>
-        </p:nvSpPr>
-        <p:spPr/>
-        <p:txBody>
-          <a:bodyPr/>
-          <a:lstStyle/>
-          <a:p>
-            <a:pPr fontAlgn="base"/>
-            <a:r>
-              <a:rPr lang="en-US" dirty="0" err="1"/>
-              <a:t>qqOsman</a:t>
-            </a:r>
-            <a:endParaRPr lang="en-US" dirty="0"/>
-          </a:p>
-          <a:p>
-            <a:endParaRPr lang="en-US" dirty="0"/>
+          <p:cNvPr id="4" name="Title 3">
+            <a:extLst>
+              <a:ext uri="{FF2B5EF4-FFF2-40B4-BE49-F238E27FC236}">
+                <a16:creationId xmlns:a16="http://schemas.microsoft.com/office/drawing/2014/main" id="{B9E80BC2-4589-4F4D-8C68-24FFC67D1426}"/>
+              </a:ext>
+            </a:extLst>
+          </p:cNvPr>
+          <p:cNvSpPr>
+            <a:spLocks noGrp="1"/>
+          </p:cNvSpPr>
+          <p:nvPr>
+            <p:ph type="ctrTitle"/>
+          </p:nvPr>
+        </p:nvSpPr>
+        <p:spPr>
+          <a:xfrm>
+            <a:off x="416859" y="1122363"/>
+            <a:ext cx="10838329" cy="2387600"/>
+          </a:xfrm>
+        </p:spPr>
+        <p:txBody>
+          <a:bodyPr>
+            <a:normAutofit/>
+          </a:bodyPr>
+          <a:lstStyle/>
+          <a:p>
+            <a:pPr algn="l"/>
+            <a:r>
+              <a:rPr lang="en-US" sz="3600" dirty="0"/>
+              <a:t>Regression Model</a:t>
+            </a:r>
           </a:p>
         </p:txBody>
       </p:sp>
     </p:spTree>
     <p:extLst>
       <p:ext uri="{BB962C8B-B14F-4D97-AF65-F5344CB8AC3E}">
-        <p14:creationId xmlns:p14="http://schemas.microsoft.com/office/powerpoint/2010/main" val="1998129388"/>
+        <p14:creationId xmlns:p14="http://schemas.microsoft.com/office/powerpoint/2010/main" val="2366447657"/>
       </p:ext>
     </p:extLst>
   </p:cSld>
@@ -5306,7 +5501,7 @@
           <p:cNvPr id="2" name="Title 1">
             <a:extLst>
               <a:ext uri="{FF2B5EF4-FFF2-40B4-BE49-F238E27FC236}">
-                <a16:creationId xmlns:a16="http://schemas.microsoft.com/office/drawing/2014/main" id="{797AEA03-72AA-4A62-9C5E-93A1D60018B1}"/>
+                <a16:creationId xmlns:a16="http://schemas.microsoft.com/office/drawing/2014/main" id="{E3D71C4E-63CB-4FE7-B972-B803D7679B03}"/>
               </a:ext>
             </a:extLst>
           </p:cNvPr>
@@ -5324,7 +5519,7 @@
           <a:p>
             <a:r>
               <a:rPr lang="en-US" dirty="0"/>
-              <a:t>Model Refinement</a:t>
+              <a:t>Model Creation</a:t>
             </a:r>
           </a:p>
         </p:txBody>
@@ -5334,7 +5529,7 @@
           <p:cNvPr id="3" name="Content Placeholder 2">
             <a:extLst>
               <a:ext uri="{FF2B5EF4-FFF2-40B4-BE49-F238E27FC236}">
-                <a16:creationId xmlns:a16="http://schemas.microsoft.com/office/drawing/2014/main" id="{0872993A-5D50-4F30-BA62-56A008497EB7}"/>
+                <a16:creationId xmlns:a16="http://schemas.microsoft.com/office/drawing/2014/main" id="{0E62FB0E-6CF7-48F8-8A90-0CDCAE26F087}"/>
               </a:ext>
             </a:extLst>
           </p:cNvPr>
@@ -5350,10 +5545,14 @@
           <a:bodyPr/>
           <a:lstStyle/>
           <a:p>
+            <a:pPr fontAlgn="base"/>
             <a:r>
               <a:rPr lang="en-US" dirty="0" err="1"/>
               <a:t>qqOsman</a:t>
             </a:r>
+            <a:endParaRPr lang="en-US" dirty="0"/>
+          </a:p>
+          <a:p>
             <a:endParaRPr lang="en-US" dirty="0"/>
           </a:p>
         </p:txBody>
@@ -5361,7 +5560,7 @@
     </p:spTree>
     <p:extLst>
       <p:ext uri="{BB962C8B-B14F-4D97-AF65-F5344CB8AC3E}">
-        <p14:creationId xmlns:p14="http://schemas.microsoft.com/office/powerpoint/2010/main" val="3407115648"/>
+        <p14:creationId xmlns:p14="http://schemas.microsoft.com/office/powerpoint/2010/main" val="1998129388"/>
       </p:ext>
     </p:extLst>
   </p:cSld>
@@ -5393,7 +5592,7 @@
           <p:cNvPr id="2" name="Title 1">
             <a:extLst>
               <a:ext uri="{FF2B5EF4-FFF2-40B4-BE49-F238E27FC236}">
-                <a16:creationId xmlns:a16="http://schemas.microsoft.com/office/drawing/2014/main" id="{1180966A-6DCE-45CB-B2B4-A4CB78B27016}"/>
+                <a16:creationId xmlns:a16="http://schemas.microsoft.com/office/drawing/2014/main" id="{797AEA03-72AA-4A62-9C5E-93A1D60018B1}"/>
               </a:ext>
             </a:extLst>
           </p:cNvPr>
@@ -5411,7 +5610,7 @@
           <a:p>
             <a:r>
               <a:rPr lang="en-US" dirty="0"/>
-              <a:t>Model Limitations</a:t>
+              <a:t>Model Refinement</a:t>
             </a:r>
           </a:p>
         </p:txBody>
@@ -5421,7 +5620,7 @@
           <p:cNvPr id="3" name="Content Placeholder 2">
             <a:extLst>
               <a:ext uri="{FF2B5EF4-FFF2-40B4-BE49-F238E27FC236}">
-                <a16:creationId xmlns:a16="http://schemas.microsoft.com/office/drawing/2014/main" id="{57574260-73D6-4C2F-B05F-DA8EA9C8CA88}"/>
+                <a16:creationId xmlns:a16="http://schemas.microsoft.com/office/drawing/2014/main" id="{0872993A-5D50-4F30-BA62-56A008497EB7}"/>
               </a:ext>
             </a:extLst>
           </p:cNvPr>
@@ -5448,7 +5647,7 @@
     </p:spTree>
     <p:extLst>
       <p:ext uri="{BB962C8B-B14F-4D97-AF65-F5344CB8AC3E}">
-        <p14:creationId xmlns:p14="http://schemas.microsoft.com/office/powerpoint/2010/main" val="1698259041"/>
+        <p14:creationId xmlns:p14="http://schemas.microsoft.com/office/powerpoint/2010/main" val="3407115648"/>
       </p:ext>
     </p:extLst>
   </p:cSld>
@@ -5480,7 +5679,7 @@
           <p:cNvPr id="2" name="Title 1">
             <a:extLst>
               <a:ext uri="{FF2B5EF4-FFF2-40B4-BE49-F238E27FC236}">
-                <a16:creationId xmlns:a16="http://schemas.microsoft.com/office/drawing/2014/main" id="{A58B4A80-B4DD-4EFB-80F6-CE4AED5F00B1}"/>
+                <a16:creationId xmlns:a16="http://schemas.microsoft.com/office/drawing/2014/main" id="{1180966A-6DCE-45CB-B2B4-A4CB78B27016}"/>
               </a:ext>
             </a:extLst>
           </p:cNvPr>
@@ -5498,7 +5697,7 @@
           <a:p>
             <a:r>
               <a:rPr lang="en-US" dirty="0"/>
-              <a:t>Model Outcomes</a:t>
+              <a:t>Model Limitations</a:t>
             </a:r>
           </a:p>
         </p:txBody>
@@ -5508,7 +5707,7 @@
           <p:cNvPr id="3" name="Content Placeholder 2">
             <a:extLst>
               <a:ext uri="{FF2B5EF4-FFF2-40B4-BE49-F238E27FC236}">
-                <a16:creationId xmlns:a16="http://schemas.microsoft.com/office/drawing/2014/main" id="{43DD36A2-8495-431F-83BA-B5F0C4C38CFB}"/>
+                <a16:creationId xmlns:a16="http://schemas.microsoft.com/office/drawing/2014/main" id="{57574260-73D6-4C2F-B05F-DA8EA9C8CA88}"/>
               </a:ext>
             </a:extLst>
           </p:cNvPr>
@@ -5535,7 +5734,7 @@
     </p:spTree>
     <p:extLst>
       <p:ext uri="{BB962C8B-B14F-4D97-AF65-F5344CB8AC3E}">
-        <p14:creationId xmlns:p14="http://schemas.microsoft.com/office/powerpoint/2010/main" val="202907545"/>
+        <p14:creationId xmlns:p14="http://schemas.microsoft.com/office/powerpoint/2010/main" val="1698259041"/>
       </p:ext>
     </p:extLst>
   </p:cSld>
@@ -5564,44 +5763,65 @@
       </p:grpSpPr>
       <p:sp>
         <p:nvSpPr>
-          <p:cNvPr id="4" name="Title 3">
-            <a:extLst>
-              <a:ext uri="{FF2B5EF4-FFF2-40B4-BE49-F238E27FC236}">
-                <a16:creationId xmlns:a16="http://schemas.microsoft.com/office/drawing/2014/main" id="{B9E80BC2-4589-4F4D-8C68-24FFC67D1426}"/>
-              </a:ext>
-            </a:extLst>
-          </p:cNvPr>
-          <p:cNvSpPr>
-            <a:spLocks noGrp="1"/>
-          </p:cNvSpPr>
-          <p:nvPr>
-            <p:ph type="ctrTitle"/>
-          </p:nvPr>
-        </p:nvSpPr>
-        <p:spPr>
-          <a:xfrm>
-            <a:off x="416859" y="1122363"/>
-            <a:ext cx="10838329" cy="2387600"/>
-          </a:xfrm>
-        </p:spPr>
-        <p:txBody>
-          <a:bodyPr>
-            <a:normAutofit/>
-          </a:bodyPr>
-          <a:lstStyle/>
-          <a:p>
-            <a:pPr algn="l"/>
-            <a:r>
-              <a:rPr lang="en-US" sz="3600" dirty="0"/>
-              <a:t>Research &amp; Data Analysis </a:t>
-            </a:r>
+          <p:cNvPr id="2" name="Title 1">
+            <a:extLst>
+              <a:ext uri="{FF2B5EF4-FFF2-40B4-BE49-F238E27FC236}">
+                <a16:creationId xmlns:a16="http://schemas.microsoft.com/office/drawing/2014/main" id="{A58B4A80-B4DD-4EFB-80F6-CE4AED5F00B1}"/>
+              </a:ext>
+            </a:extLst>
+          </p:cNvPr>
+          <p:cNvSpPr>
+            <a:spLocks noGrp="1"/>
+          </p:cNvSpPr>
+          <p:nvPr>
+            <p:ph type="title"/>
+          </p:nvPr>
+        </p:nvSpPr>
+        <p:spPr/>
+        <p:txBody>
+          <a:bodyPr/>
+          <a:lstStyle/>
+          <a:p>
+            <a:r>
+              <a:rPr lang="en-US" dirty="0"/>
+              <a:t>Model Outcomes</a:t>
+            </a:r>
+          </a:p>
+        </p:txBody>
+      </p:sp>
+      <p:sp>
+        <p:nvSpPr>
+          <p:cNvPr id="3" name="Content Placeholder 2">
+            <a:extLst>
+              <a:ext uri="{FF2B5EF4-FFF2-40B4-BE49-F238E27FC236}">
+                <a16:creationId xmlns:a16="http://schemas.microsoft.com/office/drawing/2014/main" id="{43DD36A2-8495-431F-83BA-B5F0C4C38CFB}"/>
+              </a:ext>
+            </a:extLst>
+          </p:cNvPr>
+          <p:cNvSpPr>
+            <a:spLocks noGrp="1"/>
+          </p:cNvSpPr>
+          <p:nvPr>
+            <p:ph idx="1"/>
+          </p:nvPr>
+        </p:nvSpPr>
+        <p:spPr/>
+        <p:txBody>
+          <a:bodyPr/>
+          <a:lstStyle/>
+          <a:p>
+            <a:r>
+              <a:rPr lang="en-US" dirty="0" err="1"/>
+              <a:t>qqOsman</a:t>
+            </a:r>
+            <a:endParaRPr lang="en-US" dirty="0"/>
           </a:p>
         </p:txBody>
       </p:sp>
     </p:spTree>
     <p:extLst>
       <p:ext uri="{BB962C8B-B14F-4D97-AF65-F5344CB8AC3E}">
-        <p14:creationId xmlns:p14="http://schemas.microsoft.com/office/powerpoint/2010/main" val="2442058615"/>
+        <p14:creationId xmlns:p14="http://schemas.microsoft.com/office/powerpoint/2010/main" val="202907545"/>
       </p:ext>
     </p:extLst>
   </p:cSld>
@@ -6312,88 +6532,36 @@
       </p:grpSpPr>
       <p:sp>
         <p:nvSpPr>
-          <p:cNvPr id="2" name="Title 1">
-            <a:extLst>
-              <a:ext uri="{FF2B5EF4-FFF2-40B4-BE49-F238E27FC236}">
-                <a16:creationId xmlns:a16="http://schemas.microsoft.com/office/drawing/2014/main" id="{624DC2CB-8BD0-C849-B52E-0F91A40C741E}"/>
-              </a:ext>
-            </a:extLst>
-          </p:cNvPr>
-          <p:cNvSpPr>
-            <a:spLocks noGrp="1"/>
-          </p:cNvSpPr>
-          <p:nvPr>
-            <p:ph type="title"/>
-          </p:nvPr>
-        </p:nvSpPr>
-        <p:spPr/>
-        <p:txBody>
-          <a:bodyPr/>
-          <a:lstStyle/>
-          <a:p>
-            <a:r>
-              <a:rPr lang="en-US" dirty="0"/>
-              <a:t>What Does the Data Tell Us?</a:t>
-            </a:r>
-          </a:p>
-        </p:txBody>
-      </p:sp>
-      <p:sp>
-        <p:nvSpPr>
-          <p:cNvPr id="3" name="Content Placeholder 2">
-            <a:extLst>
-              <a:ext uri="{FF2B5EF4-FFF2-40B4-BE49-F238E27FC236}">
-                <a16:creationId xmlns:a16="http://schemas.microsoft.com/office/drawing/2014/main" id="{399E939B-CD29-D445-B69B-5A724813DF0B}"/>
-              </a:ext>
-            </a:extLst>
-          </p:cNvPr>
-          <p:cNvSpPr>
-            <a:spLocks noGrp="1"/>
-          </p:cNvSpPr>
-          <p:nvPr>
-            <p:ph idx="1"/>
-          </p:nvPr>
-        </p:nvSpPr>
-        <p:spPr/>
-        <p:txBody>
-          <a:bodyPr/>
-          <a:lstStyle/>
-          <a:p>
-            <a:r>
-              <a:rPr lang="en-US" dirty="0"/>
-              <a:t>Sections:</a:t>
-            </a:r>
-          </a:p>
-          <a:p>
-            <a:endParaRPr lang="en-US" dirty="0"/>
-          </a:p>
-          <a:p>
-            <a:pPr lvl="1"/>
-            <a:r>
-              <a:rPr lang="en-US" dirty="0"/>
-              <a:t>Impact of Economic Indicators (GDP)</a:t>
-            </a:r>
-          </a:p>
-          <a:p>
-            <a:pPr lvl="1"/>
-            <a:endParaRPr lang="en-US" dirty="0"/>
-          </a:p>
-          <a:p>
-            <a:pPr lvl="1"/>
-            <a:r>
-              <a:rPr lang="en-US" dirty="0"/>
-              <a:t>Impact of Substance Abuse Indications (Alcohol Abuse)</a:t>
-            </a:r>
-          </a:p>
-          <a:p>
-            <a:pPr lvl="1"/>
-            <a:endParaRPr lang="en-US" dirty="0"/>
-          </a:p>
-          <a:p>
-            <a:pPr lvl="1"/>
-            <a:r>
-              <a:rPr lang="en-US" dirty="0"/>
-              <a:t>Impact of Mental Health Resources</a:t>
+          <p:cNvPr id="4" name="Title 3">
+            <a:extLst>
+              <a:ext uri="{FF2B5EF4-FFF2-40B4-BE49-F238E27FC236}">
+                <a16:creationId xmlns:a16="http://schemas.microsoft.com/office/drawing/2014/main" id="{B9E80BC2-4589-4F4D-8C68-24FFC67D1426}"/>
+              </a:ext>
+            </a:extLst>
+          </p:cNvPr>
+          <p:cNvSpPr>
+            <a:spLocks noGrp="1"/>
+          </p:cNvSpPr>
+          <p:nvPr>
+            <p:ph type="ctrTitle"/>
+          </p:nvPr>
+        </p:nvSpPr>
+        <p:spPr>
+          <a:xfrm>
+            <a:off x="416859" y="1122363"/>
+            <a:ext cx="10838329" cy="2387600"/>
+          </a:xfrm>
+        </p:spPr>
+        <p:txBody>
+          <a:bodyPr>
+            <a:normAutofit/>
+          </a:bodyPr>
+          <a:lstStyle/>
+          <a:p>
+            <a:pPr algn="l"/>
+            <a:r>
+              <a:rPr lang="en-US" sz="3600" dirty="0"/>
+              <a:t>Research &amp; Data Analysis </a:t>
             </a:r>
           </a:p>
         </p:txBody>
@@ -6401,7 +6569,7 @@
     </p:spTree>
     <p:extLst>
       <p:ext uri="{BB962C8B-B14F-4D97-AF65-F5344CB8AC3E}">
-        <p14:creationId xmlns:p14="http://schemas.microsoft.com/office/powerpoint/2010/main" val="182351577"/>
+        <p14:creationId xmlns:p14="http://schemas.microsoft.com/office/powerpoint/2010/main" val="2442058615"/>
       </p:ext>
     </p:extLst>
   </p:cSld>
@@ -6451,7 +6619,7 @@
           <a:p>
             <a:r>
               <a:rPr lang="en-US" dirty="0"/>
-              <a:t>Impact of Wealth, Country Level Economic Indicators</a:t>
+              <a:t>What Does the Data Tell Us?</a:t>
             </a:r>
           </a:p>
         </p:txBody>
@@ -6479,55 +6647,58 @@
           <a:p>
             <a:r>
               <a:rPr lang="en-US" dirty="0"/>
-              <a:t>Exploratory Analysis - Visual</a:t>
+              <a:t>Sections:</a:t>
             </a:r>
           </a:p>
           <a:p>
             <a:endParaRPr lang="en-US" dirty="0"/>
           </a:p>
           <a:p>
+            <a:pPr lvl="1"/>
             <a:r>
               <a:rPr lang="en-US" dirty="0"/>
-              <a:t>Testing (Hypothesis etc.)</a:t>
-            </a:r>
-          </a:p>
-          <a:p>
+              <a:t>Impact of Current Health Expenditure as % GDP</a:t>
+            </a:r>
+          </a:p>
+          <a:p>
+            <a:pPr lvl="1"/>
             <a:endParaRPr lang="en-US" dirty="0"/>
           </a:p>
           <a:p>
-            <a:r>
-              <a:rPr lang="en-US" dirty="0" err="1"/>
-              <a:t>Elasiticity</a:t>
-            </a:r>
+            <a:pPr lvl="1"/>
             <a:r>
               <a:rPr lang="en-US" dirty="0"/>
-              <a:t>/impact on our outcome</a:t>
-            </a:r>
-          </a:p>
-          <a:p>
+              <a:t>Impact of Substance Abuse Indications (Alcohol Abuse)</a:t>
+            </a:r>
+          </a:p>
+          <a:p>
+            <a:pPr lvl="1"/>
             <a:endParaRPr lang="en-US" dirty="0"/>
           </a:p>
           <a:p>
+            <a:pPr lvl="1"/>
             <a:r>
               <a:rPr lang="en-US" dirty="0"/>
-              <a:t>What policy makers should know</a:t>
-            </a:r>
-          </a:p>
-          <a:p>
+              <a:t>Impact of Mental Health Resources (Psychiatrists working in mental health sector (per 100000 population) )</a:t>
+            </a:r>
+          </a:p>
+          <a:p>
+            <a:pPr lvl="1"/>
             <a:endParaRPr lang="en-US" dirty="0"/>
           </a:p>
           <a:p>
-            <a:endParaRPr lang="en-US" dirty="0"/>
-          </a:p>
-          <a:p>
-            <a:endParaRPr lang="en-US" dirty="0"/>
+            <a:pPr lvl="1"/>
+            <a:r>
+              <a:rPr lang="en-US" dirty="0"/>
+              <a:t>Impact of National Suicide Prevention Strategies (NSPS)</a:t>
+            </a:r>
           </a:p>
         </p:txBody>
       </p:sp>
     </p:spTree>
     <p:extLst>
       <p:ext uri="{BB962C8B-B14F-4D97-AF65-F5344CB8AC3E}">
-        <p14:creationId xmlns:p14="http://schemas.microsoft.com/office/powerpoint/2010/main" val="1808011340"/>
+        <p14:creationId xmlns:p14="http://schemas.microsoft.com/office/powerpoint/2010/main" val="182351577"/>
       </p:ext>
     </p:extLst>
   </p:cSld>
@@ -6577,7 +6748,7 @@
           <a:p>
             <a:r>
               <a:rPr lang="en-US" dirty="0"/>
-              <a:t>Impact Alcohol Abuse</a:t>
+              <a:t>Impact of Current Health Expenditure as % GDP </a:t>
             </a:r>
           </a:p>
         </p:txBody>
@@ -6600,21 +6771,12 @@
         </p:nvSpPr>
         <p:spPr/>
         <p:txBody>
-          <a:bodyPr>
-            <a:normAutofit fontScale="77500" lnSpcReduction="20000"/>
-          </a:bodyPr>
+          <a:bodyPr/>
           <a:lstStyle/>
           <a:p>
             <a:r>
               <a:rPr lang="en-US" dirty="0"/>
-              <a:t>Exploratory Analysis – Visual</a:t>
-            </a:r>
-          </a:p>
-          <a:p>
-            <a:pPr lvl="1"/>
-            <a:r>
-              <a:rPr lang="en-US" dirty="0"/>
-              <a:t>An association exists between alcohol consumption and the rate of suicide.</a:t>
+              <a:t>Exploratory Analysis - Visual</a:t>
             </a:r>
           </a:p>
           <a:p>
@@ -6627,13 +6789,6 @@
             </a:r>
           </a:p>
           <a:p>
-            <a:pPr lvl="1"/>
-            <a:r>
-              <a:rPr lang="en-US" dirty="0"/>
-              <a:t>Countries with higher rates of alcohol consumption tend to have higher suicide rates. By reducing the amount of alcohol consumed, suicides will be reduced. </a:t>
-            </a:r>
-          </a:p>
-          <a:p>
             <a:endParaRPr lang="en-US" dirty="0"/>
           </a:p>
           <a:p>
@@ -6647,43 +6802,82 @@
             </a:r>
           </a:p>
           <a:p>
-            <a:pPr lvl="1"/>
+            <a:endParaRPr lang="en-US" dirty="0"/>
+          </a:p>
+          <a:p>
             <a:r>
               <a:rPr lang="en-US" dirty="0"/>
-              <a:t>Each X-unit increase/decrease in liters of alcohol consumed per capita resulted in Y-unit increase/decrease in the rate of suicide per capita.</a:t>
+              <a:t>What policy makers should know</a:t>
             </a:r>
           </a:p>
           <a:p>
             <a:endParaRPr lang="en-US" dirty="0"/>
           </a:p>
           <a:p>
-            <a:r>
-              <a:rPr lang="en-US" dirty="0"/>
-              <a:t>What policy makers should know and do</a:t>
-            </a:r>
-          </a:p>
-          <a:p>
-            <a:pPr lvl="1"/>
-            <a:r>
-              <a:rPr lang="en-US" dirty="0"/>
-              <a:t>Policy makers should consider implementing measures designed to mitigate the harmful use of alcohol as a means of reducing the rate of suicide.</a:t>
-            </a:r>
-          </a:p>
-          <a:p>
             <a:endParaRPr lang="en-US" dirty="0"/>
           </a:p>
           <a:p>
             <a:endParaRPr lang="en-US" dirty="0"/>
           </a:p>
-          <a:p>
-            <a:endParaRPr lang="en-US" dirty="0"/>
+        </p:txBody>
+      </p:sp>
+      <p:sp>
+        <p:nvSpPr>
+          <p:cNvPr id="4" name="Rectangle 3">
+            <a:extLst>
+              <a:ext uri="{FF2B5EF4-FFF2-40B4-BE49-F238E27FC236}">
+                <a16:creationId xmlns:a16="http://schemas.microsoft.com/office/drawing/2014/main" id="{316A1E26-2C9F-4953-A41D-EDE351B31FAB}"/>
+              </a:ext>
+            </a:extLst>
+          </p:cNvPr>
+          <p:cNvSpPr/>
+          <p:nvPr/>
+        </p:nvSpPr>
+        <p:spPr>
+          <a:xfrm rot="1919411">
+            <a:off x="5893905" y="1627570"/>
+            <a:ext cx="5367131" cy="2097156"/>
+          </a:xfrm>
+          <a:prstGeom prst="rect">
+            <a:avLst/>
+          </a:prstGeom>
+          <a:solidFill>
+            <a:srgbClr val="FF0000"/>
+          </a:solidFill>
+        </p:spPr>
+        <p:style>
+          <a:lnRef idx="2">
+            <a:schemeClr val="accent2">
+              <a:shade val="50000"/>
+            </a:schemeClr>
+          </a:lnRef>
+          <a:fillRef idx="1">
+            <a:schemeClr val="accent2"/>
+          </a:fillRef>
+          <a:effectRef idx="0">
+            <a:schemeClr val="accent2"/>
+          </a:effectRef>
+          <a:fontRef idx="minor">
+            <a:schemeClr val="lt1"/>
+          </a:fontRef>
+        </p:style>
+        <p:txBody>
+          <a:bodyPr rtlCol="0" anchor="ctr"/>
+          <a:lstStyle/>
+          <a:p>
+            <a:pPr algn="ctr"/>
+            <a:r>
+              <a:rPr lang="en-US" sz="6000" dirty="0" err="1"/>
+              <a:t>qqMichael</a:t>
+            </a:r>
+            <a:endParaRPr lang="en-US" sz="6000" dirty="0"/>
           </a:p>
         </p:txBody>
       </p:sp>
     </p:spTree>
     <p:extLst>
       <p:ext uri="{BB962C8B-B14F-4D97-AF65-F5344CB8AC3E}">
-        <p14:creationId xmlns:p14="http://schemas.microsoft.com/office/powerpoint/2010/main" val="2733299390"/>
+        <p14:creationId xmlns:p14="http://schemas.microsoft.com/office/powerpoint/2010/main" val="1808011340"/>
       </p:ext>
     </p:extLst>
   </p:cSld>
@@ -6733,7 +6927,7 @@
           <a:p>
             <a:r>
               <a:rPr lang="en-US" dirty="0"/>
-              <a:t>Impact of Availability of Mental Health Resources</a:t>
+              <a:t>Impact Alcohol Abuse</a:t>
             </a:r>
           </a:p>
         </p:txBody>
@@ -6756,12 +6950,21 @@
         </p:nvSpPr>
         <p:spPr/>
         <p:txBody>
-          <a:bodyPr/>
+          <a:bodyPr>
+            <a:normAutofit fontScale="77500" lnSpcReduction="20000"/>
+          </a:bodyPr>
           <a:lstStyle/>
           <a:p>
             <a:r>
               <a:rPr lang="en-US" dirty="0"/>
-              <a:t>Exploratory Analysis - Visual</a:t>
+              <a:t>Exploratory Analysis – Visual</a:t>
+            </a:r>
+          </a:p>
+          <a:p>
+            <a:pPr lvl="1"/>
+            <a:r>
+              <a:rPr lang="en-US" dirty="0"/>
+              <a:t>An association exists between alcohol consumption and the rate of suicide.</a:t>
             </a:r>
           </a:p>
           <a:p>
@@ -6774,6 +6977,13 @@
             </a:r>
           </a:p>
           <a:p>
+            <a:pPr lvl="1"/>
+            <a:r>
+              <a:rPr lang="en-US" dirty="0"/>
+              <a:t>Countries with higher rates of alcohol consumption tend to have higher suicide rates. By reducing the amount of alcohol consumed, suicides will be reduced. </a:t>
+            </a:r>
+          </a:p>
+          <a:p>
             <a:endParaRPr lang="en-US" dirty="0"/>
           </a:p>
           <a:p>
@@ -6787,12 +6997,26 @@
             </a:r>
           </a:p>
           <a:p>
+            <a:pPr lvl="1"/>
+            <a:r>
+              <a:rPr lang="en-US" dirty="0"/>
+              <a:t>Each X-unit increase/decrease in liters of alcohol consumed per capita resulted in Y-unit increase/decrease in the rate of suicide per capita.</a:t>
+            </a:r>
+          </a:p>
+          <a:p>
             <a:endParaRPr lang="en-US" dirty="0"/>
           </a:p>
           <a:p>
             <a:r>
               <a:rPr lang="en-US" dirty="0"/>
-              <a:t>What policy makers should know</a:t>
+              <a:t>What policy makers should know and do</a:t>
+            </a:r>
+          </a:p>
+          <a:p>
+            <a:pPr lvl="1"/>
+            <a:r>
+              <a:rPr lang="en-US" dirty="0"/>
+              <a:t>Policy makers should consider implementing measures designed to mitigate the harmful use of alcohol as a means of reducing the rate of suicide.</a:t>
             </a:r>
           </a:p>
           <a:p>
@@ -6809,7 +7033,7 @@
     </p:spTree>
     <p:extLst>
       <p:ext uri="{BB962C8B-B14F-4D97-AF65-F5344CB8AC3E}">
-        <p14:creationId xmlns:p14="http://schemas.microsoft.com/office/powerpoint/2010/main" val="3553279853"/>
+        <p14:creationId xmlns:p14="http://schemas.microsoft.com/office/powerpoint/2010/main" val="2733299390"/>
       </p:ext>
     </p:extLst>
   </p:cSld>
@@ -6859,7 +7083,7 @@
           <a:p>
             <a:r>
               <a:rPr lang="en-US" dirty="0"/>
-              <a:t>Impact of Availability of Mental Health Resources</a:t>
+              <a:t>Impact of Psychiatrists working in mental health sector (per 100000 population) </a:t>
             </a:r>
           </a:p>
         </p:txBody>
@@ -6929,13 +7153,66 @@
           </a:p>
           <a:p>
             <a:endParaRPr lang="en-US" dirty="0"/>
+          </a:p>
+        </p:txBody>
+      </p:sp>
+      <p:sp>
+        <p:nvSpPr>
+          <p:cNvPr id="4" name="Rectangle 3">
+            <a:extLst>
+              <a:ext uri="{FF2B5EF4-FFF2-40B4-BE49-F238E27FC236}">
+                <a16:creationId xmlns:a16="http://schemas.microsoft.com/office/drawing/2014/main" id="{059A0453-6D5E-4AA1-9847-15F6A6F7C1A2}"/>
+              </a:ext>
+            </a:extLst>
+          </p:cNvPr>
+          <p:cNvSpPr/>
+          <p:nvPr/>
+        </p:nvSpPr>
+        <p:spPr>
+          <a:xfrm rot="1919411">
+            <a:off x="5893905" y="1627570"/>
+            <a:ext cx="5367131" cy="2097156"/>
+          </a:xfrm>
+          <a:prstGeom prst="rect">
+            <a:avLst/>
+          </a:prstGeom>
+          <a:solidFill>
+            <a:srgbClr val="FF0000"/>
+          </a:solidFill>
+        </p:spPr>
+        <p:style>
+          <a:lnRef idx="2">
+            <a:schemeClr val="accent2">
+              <a:shade val="50000"/>
+            </a:schemeClr>
+          </a:lnRef>
+          <a:fillRef idx="1">
+            <a:schemeClr val="accent2"/>
+          </a:fillRef>
+          <a:effectRef idx="0">
+            <a:schemeClr val="accent2"/>
+          </a:effectRef>
+          <a:fontRef idx="minor">
+            <a:schemeClr val="lt1"/>
+          </a:fontRef>
+        </p:style>
+        <p:txBody>
+          <a:bodyPr rtlCol="0" anchor="ctr"/>
+          <a:lstStyle/>
+          <a:p>
+            <a:pPr algn="ctr"/>
+            <a:r>
+              <a:rPr lang="en-US" sz="6000" dirty="0" err="1"/>
+              <a:t>qqMichael</a:t>
+            </a:r>
+            <a:endParaRPr lang="en-US" sz="6000" dirty="0"/>
           </a:p>
         </p:txBody>
       </p:sp>
     </p:spTree>
     <p:extLst>
       <p:ext uri="{BB962C8B-B14F-4D97-AF65-F5344CB8AC3E}">
-        <p14:creationId xmlns:p14="http://schemas.microsoft.com/office/powerpoint/2010/main" val="2745908012"/>
+        <p14:creationId xmlns:p14="http://schemas.microsoft.com/office/powerpoint/2010/main" val="3553279853"/>
       </p:ext>
     </p:extLst>
   </p:cSld>
@@ -6964,44 +7241,157 @@
       </p:grpSpPr>
       <p:sp>
         <p:nvSpPr>
-          <p:cNvPr id="4" name="Title 3">
-            <a:extLst>
-              <a:ext uri="{FF2B5EF4-FFF2-40B4-BE49-F238E27FC236}">
-                <a16:creationId xmlns:a16="http://schemas.microsoft.com/office/drawing/2014/main" id="{B9E80BC2-4589-4F4D-8C68-24FFC67D1426}"/>
-              </a:ext>
-            </a:extLst>
-          </p:cNvPr>
-          <p:cNvSpPr>
-            <a:spLocks noGrp="1"/>
-          </p:cNvSpPr>
-          <p:nvPr>
-            <p:ph type="ctrTitle"/>
-          </p:nvPr>
+          <p:cNvPr id="2" name="Title 1">
+            <a:extLst>
+              <a:ext uri="{FF2B5EF4-FFF2-40B4-BE49-F238E27FC236}">
+                <a16:creationId xmlns:a16="http://schemas.microsoft.com/office/drawing/2014/main" id="{624DC2CB-8BD0-C849-B52E-0F91A40C741E}"/>
+              </a:ext>
+            </a:extLst>
+          </p:cNvPr>
+          <p:cNvSpPr>
+            <a:spLocks noGrp="1"/>
+          </p:cNvSpPr>
+          <p:nvPr>
+            <p:ph type="title"/>
+          </p:nvPr>
+        </p:nvSpPr>
+        <p:spPr/>
+        <p:txBody>
+          <a:bodyPr/>
+          <a:lstStyle/>
+          <a:p>
+            <a:r>
+              <a:rPr lang="en-US" dirty="0"/>
+              <a:t>Impact of NSPS</a:t>
+            </a:r>
+          </a:p>
+        </p:txBody>
+      </p:sp>
+      <p:sp>
+        <p:nvSpPr>
+          <p:cNvPr id="3" name="Content Placeholder 2">
+            <a:extLst>
+              <a:ext uri="{FF2B5EF4-FFF2-40B4-BE49-F238E27FC236}">
+                <a16:creationId xmlns:a16="http://schemas.microsoft.com/office/drawing/2014/main" id="{399E939B-CD29-D445-B69B-5A724813DF0B}"/>
+              </a:ext>
+            </a:extLst>
+          </p:cNvPr>
+          <p:cNvSpPr>
+            <a:spLocks noGrp="1"/>
+          </p:cNvSpPr>
+          <p:nvPr>
+            <p:ph idx="1"/>
+          </p:nvPr>
+        </p:nvSpPr>
+        <p:spPr/>
+        <p:txBody>
+          <a:bodyPr/>
+          <a:lstStyle/>
+          <a:p>
+            <a:r>
+              <a:rPr lang="en-US" dirty="0"/>
+              <a:t>Exploratory Analysis - Visual</a:t>
+            </a:r>
+          </a:p>
+          <a:p>
+            <a:endParaRPr lang="en-US" dirty="0"/>
+          </a:p>
+          <a:p>
+            <a:r>
+              <a:rPr lang="en-US" dirty="0"/>
+              <a:t>Testing (Hypothesis etc.)</a:t>
+            </a:r>
+          </a:p>
+          <a:p>
+            <a:endParaRPr lang="en-US" dirty="0"/>
+          </a:p>
+          <a:p>
+            <a:r>
+              <a:rPr lang="en-US" dirty="0" err="1"/>
+              <a:t>Elasiticity</a:t>
+            </a:r>
+            <a:r>
+              <a:rPr lang="en-US" dirty="0"/>
+              <a:t>/impact on our outcome</a:t>
+            </a:r>
+          </a:p>
+          <a:p>
+            <a:endParaRPr lang="en-US" dirty="0"/>
+          </a:p>
+          <a:p>
+            <a:r>
+              <a:rPr lang="en-US" dirty="0"/>
+              <a:t>What policy makers should know</a:t>
+            </a:r>
+          </a:p>
+          <a:p>
+            <a:endParaRPr lang="en-US" dirty="0"/>
+          </a:p>
+          <a:p>
+            <a:endParaRPr lang="en-US" dirty="0"/>
+          </a:p>
+          <a:p>
+            <a:endParaRPr lang="en-US" dirty="0"/>
+          </a:p>
+        </p:txBody>
+      </p:sp>
+      <p:sp>
+        <p:nvSpPr>
+          <p:cNvPr id="4" name="Rectangle 3">
+            <a:extLst>
+              <a:ext uri="{FF2B5EF4-FFF2-40B4-BE49-F238E27FC236}">
+                <a16:creationId xmlns:a16="http://schemas.microsoft.com/office/drawing/2014/main" id="{A4EB4297-D4D3-42DB-BEFD-747C53900203}"/>
+              </a:ext>
+            </a:extLst>
+          </p:cNvPr>
+          <p:cNvSpPr/>
+          <p:nvPr/>
         </p:nvSpPr>
         <p:spPr>
-          <a:xfrm>
-            <a:off x="416859" y="1122363"/>
-            <a:ext cx="10838329" cy="2387600"/>
+          <a:xfrm rot="1919411">
+            <a:off x="5893905" y="1627570"/>
+            <a:ext cx="5367131" cy="2097156"/>
           </a:xfrm>
+          <a:prstGeom prst="rect">
+            <a:avLst/>
+          </a:prstGeom>
+          <a:solidFill>
+            <a:srgbClr val="FF0000"/>
+          </a:solidFill>
         </p:spPr>
-        <p:txBody>
-          <a:bodyPr>
-            <a:normAutofit/>
-          </a:bodyPr>
-          <a:lstStyle/>
-          <a:p>
-            <a:pPr algn="l"/>
-            <a:r>
-              <a:rPr lang="en-US" sz="3600" dirty="0"/>
-              <a:t>Recommendations &amp; Decision Making Support for Policy Makers (Prescriptive)</a:t>
-            </a:r>
+        <p:style>
+          <a:lnRef idx="2">
+            <a:schemeClr val="accent2">
+              <a:shade val="50000"/>
+            </a:schemeClr>
+          </a:lnRef>
+          <a:fillRef idx="1">
+            <a:schemeClr val="accent2"/>
+          </a:fillRef>
+          <a:effectRef idx="0">
+            <a:schemeClr val="accent2"/>
+          </a:effectRef>
+          <a:fontRef idx="minor">
+            <a:schemeClr val="lt1"/>
+          </a:fontRef>
+        </p:style>
+        <p:txBody>
+          <a:bodyPr rtlCol="0" anchor="ctr"/>
+          <a:lstStyle/>
+          <a:p>
+            <a:pPr algn="ctr"/>
+            <a:r>
+              <a:rPr lang="en-US" sz="6000" dirty="0" err="1"/>
+              <a:t>qqMichael</a:t>
+            </a:r>
+            <a:endParaRPr lang="en-US" sz="6000" dirty="0"/>
           </a:p>
         </p:txBody>
       </p:sp>
     </p:spTree>
     <p:extLst>
       <p:ext uri="{BB962C8B-B14F-4D97-AF65-F5344CB8AC3E}">
-        <p14:creationId xmlns:p14="http://schemas.microsoft.com/office/powerpoint/2010/main" val="3276250105"/>
+        <p14:creationId xmlns:p14="http://schemas.microsoft.com/office/powerpoint/2010/main" val="2540235355"/>
       </p:ext>
     </p:extLst>
   </p:cSld>
@@ -7030,100 +7420,44 @@
       </p:grpSpPr>
       <p:sp>
         <p:nvSpPr>
-          <p:cNvPr id="2" name="Title 1">
-            <a:extLst>
-              <a:ext uri="{FF2B5EF4-FFF2-40B4-BE49-F238E27FC236}">
-                <a16:creationId xmlns:a16="http://schemas.microsoft.com/office/drawing/2014/main" id="{624DC2CB-8BD0-C849-B52E-0F91A40C741E}"/>
-              </a:ext>
-            </a:extLst>
-          </p:cNvPr>
-          <p:cNvSpPr>
-            <a:spLocks noGrp="1"/>
-          </p:cNvSpPr>
-          <p:nvPr>
-            <p:ph type="title"/>
-          </p:nvPr>
-        </p:nvSpPr>
-        <p:spPr/>
-        <p:txBody>
-          <a:bodyPr/>
-          <a:lstStyle/>
-          <a:p>
-            <a:r>
-              <a:rPr lang="en-US" dirty="0"/>
-              <a:t>What kind of Country Level Decision Making Support This Analysis Provides</a:t>
-            </a:r>
-          </a:p>
-        </p:txBody>
-      </p:sp>
-      <p:sp>
-        <p:nvSpPr>
-          <p:cNvPr id="3" name="Content Placeholder 2">
-            <a:extLst>
-              <a:ext uri="{FF2B5EF4-FFF2-40B4-BE49-F238E27FC236}">
-                <a16:creationId xmlns:a16="http://schemas.microsoft.com/office/drawing/2014/main" id="{399E939B-CD29-D445-B69B-5A724813DF0B}"/>
-              </a:ext>
-            </a:extLst>
-          </p:cNvPr>
-          <p:cNvSpPr>
-            <a:spLocks noGrp="1"/>
-          </p:cNvSpPr>
-          <p:nvPr>
-            <p:ph idx="1"/>
-          </p:nvPr>
-        </p:nvSpPr>
-        <p:spPr/>
-        <p:txBody>
-          <a:bodyPr/>
-          <a:lstStyle/>
-          <a:p>
-            <a:r>
-              <a:rPr lang="en-US" dirty="0"/>
-              <a:t>Justify investment and potential impact of decision making</a:t>
-            </a:r>
-          </a:p>
-          <a:p>
-            <a:endParaRPr lang="en-US" dirty="0"/>
-          </a:p>
-          <a:p>
-            <a:r>
-              <a:rPr lang="en-US" dirty="0"/>
-              <a:t>Bringing up statistics that would motivate decision makers</a:t>
-            </a:r>
-          </a:p>
-          <a:p>
-            <a:endParaRPr lang="en-US" dirty="0"/>
-          </a:p>
-          <a:p>
-            <a:r>
-              <a:rPr lang="en-US" dirty="0"/>
-              <a:t>Outlining a high-level strategy a country could take</a:t>
-            </a:r>
-          </a:p>
-          <a:p>
-            <a:endParaRPr lang="en-US" dirty="0"/>
-          </a:p>
-          <a:p>
-            <a:r>
-              <a:rPr lang="en-US" dirty="0"/>
-              <a:t>Highlighting where policy makers could invest in additional research to better understand the problem</a:t>
-            </a:r>
-          </a:p>
-          <a:p>
-            <a:endParaRPr lang="en-US" dirty="0"/>
-          </a:p>
-          <a:p>
-            <a:endParaRPr lang="en-US" dirty="0"/>
-          </a:p>
-          <a:p>
-            <a:endParaRPr lang="en-US" dirty="0"/>
+          <p:cNvPr id="4" name="Title 3">
+            <a:extLst>
+              <a:ext uri="{FF2B5EF4-FFF2-40B4-BE49-F238E27FC236}">
+                <a16:creationId xmlns:a16="http://schemas.microsoft.com/office/drawing/2014/main" id="{B9E80BC2-4589-4F4D-8C68-24FFC67D1426}"/>
+              </a:ext>
+            </a:extLst>
+          </p:cNvPr>
+          <p:cNvSpPr>
+            <a:spLocks noGrp="1"/>
+          </p:cNvSpPr>
+          <p:nvPr>
+            <p:ph type="ctrTitle"/>
+          </p:nvPr>
+        </p:nvSpPr>
+        <p:spPr>
+          <a:xfrm>
+            <a:off x="416859" y="1122363"/>
+            <a:ext cx="10838329" cy="2387600"/>
+          </a:xfrm>
+        </p:spPr>
+        <p:txBody>
+          <a:bodyPr>
+            <a:normAutofit/>
+          </a:bodyPr>
+          <a:lstStyle/>
+          <a:p>
+            <a:pPr algn="l"/>
+            <a:r>
+              <a:rPr lang="en-US" sz="3600" dirty="0"/>
+              <a:t>Recommendations &amp; Decision Making Support for Policy Makers (Prescriptive)</a:t>
+            </a:r>
           </a:p>
         </p:txBody>
       </p:sp>
     </p:spTree>
     <p:extLst>
       <p:ext uri="{BB962C8B-B14F-4D97-AF65-F5344CB8AC3E}">
-        <p14:creationId xmlns:p14="http://schemas.microsoft.com/office/powerpoint/2010/main" val="19698530"/>
+        <p14:creationId xmlns:p14="http://schemas.microsoft.com/office/powerpoint/2010/main" val="3276250105"/>
       </p:ext>
     </p:extLst>
   </p:cSld>
@@ -7152,44 +7486,100 @@
       </p:grpSpPr>
       <p:sp>
         <p:nvSpPr>
-          <p:cNvPr id="4" name="Title 3">
-            <a:extLst>
-              <a:ext uri="{FF2B5EF4-FFF2-40B4-BE49-F238E27FC236}">
-                <a16:creationId xmlns:a16="http://schemas.microsoft.com/office/drawing/2014/main" id="{B9E80BC2-4589-4F4D-8C68-24FFC67D1426}"/>
-              </a:ext>
-            </a:extLst>
-          </p:cNvPr>
-          <p:cNvSpPr>
-            <a:spLocks noGrp="1"/>
-          </p:cNvSpPr>
-          <p:nvPr>
-            <p:ph type="ctrTitle"/>
-          </p:nvPr>
-        </p:nvSpPr>
-        <p:spPr>
-          <a:xfrm>
-            <a:off x="416859" y="1122363"/>
-            <a:ext cx="10838329" cy="2387600"/>
-          </a:xfrm>
-        </p:spPr>
-        <p:txBody>
-          <a:bodyPr>
-            <a:normAutofit/>
-          </a:bodyPr>
-          <a:lstStyle/>
-          <a:p>
-            <a:pPr algn="l"/>
-            <a:r>
-              <a:rPr lang="en-US" sz="3600" dirty="0"/>
-              <a:t>Supporting Future Researchers on This Topic</a:t>
-            </a:r>
+          <p:cNvPr id="2" name="Title 1">
+            <a:extLst>
+              <a:ext uri="{FF2B5EF4-FFF2-40B4-BE49-F238E27FC236}">
+                <a16:creationId xmlns:a16="http://schemas.microsoft.com/office/drawing/2014/main" id="{624DC2CB-8BD0-C849-B52E-0F91A40C741E}"/>
+              </a:ext>
+            </a:extLst>
+          </p:cNvPr>
+          <p:cNvSpPr>
+            <a:spLocks noGrp="1"/>
+          </p:cNvSpPr>
+          <p:nvPr>
+            <p:ph type="title"/>
+          </p:nvPr>
+        </p:nvSpPr>
+        <p:spPr/>
+        <p:txBody>
+          <a:bodyPr/>
+          <a:lstStyle/>
+          <a:p>
+            <a:r>
+              <a:rPr lang="en-US" dirty="0"/>
+              <a:t>What kind of Country Level Decision Making Support This Analysis Provides</a:t>
+            </a:r>
+          </a:p>
+        </p:txBody>
+      </p:sp>
+      <p:sp>
+        <p:nvSpPr>
+          <p:cNvPr id="3" name="Content Placeholder 2">
+            <a:extLst>
+              <a:ext uri="{FF2B5EF4-FFF2-40B4-BE49-F238E27FC236}">
+                <a16:creationId xmlns:a16="http://schemas.microsoft.com/office/drawing/2014/main" id="{399E939B-CD29-D445-B69B-5A724813DF0B}"/>
+              </a:ext>
+            </a:extLst>
+          </p:cNvPr>
+          <p:cNvSpPr>
+            <a:spLocks noGrp="1"/>
+          </p:cNvSpPr>
+          <p:nvPr>
+            <p:ph idx="1"/>
+          </p:nvPr>
+        </p:nvSpPr>
+        <p:spPr/>
+        <p:txBody>
+          <a:bodyPr/>
+          <a:lstStyle/>
+          <a:p>
+            <a:r>
+              <a:rPr lang="en-US" dirty="0"/>
+              <a:t>Justify investment and potential impact of decision making</a:t>
+            </a:r>
+          </a:p>
+          <a:p>
+            <a:endParaRPr lang="en-US" dirty="0"/>
+          </a:p>
+          <a:p>
+            <a:r>
+              <a:rPr lang="en-US" dirty="0"/>
+              <a:t>Bringing up statistics that would motivate decision makers</a:t>
+            </a:r>
+          </a:p>
+          <a:p>
+            <a:endParaRPr lang="en-US" dirty="0"/>
+          </a:p>
+          <a:p>
+            <a:r>
+              <a:rPr lang="en-US" dirty="0"/>
+              <a:t>Outlining a high-level strategy a country could take</a:t>
+            </a:r>
+          </a:p>
+          <a:p>
+            <a:endParaRPr lang="en-US" dirty="0"/>
+          </a:p>
+          <a:p>
+            <a:r>
+              <a:rPr lang="en-US" dirty="0"/>
+              <a:t>Highlighting where policy makers could invest in additional research to better understand the problem</a:t>
+            </a:r>
+          </a:p>
+          <a:p>
+            <a:endParaRPr lang="en-US" dirty="0"/>
+          </a:p>
+          <a:p>
+            <a:endParaRPr lang="en-US" dirty="0"/>
+          </a:p>
+          <a:p>
+            <a:endParaRPr lang="en-US" dirty="0"/>
           </a:p>
         </p:txBody>
       </p:sp>
     </p:spTree>
     <p:extLst>
       <p:ext uri="{BB962C8B-B14F-4D97-AF65-F5344CB8AC3E}">
-        <p14:creationId xmlns:p14="http://schemas.microsoft.com/office/powerpoint/2010/main" val="2993728044"/>
+        <p14:creationId xmlns:p14="http://schemas.microsoft.com/office/powerpoint/2010/main" val="19698530"/>
       </p:ext>
     </p:extLst>
   </p:cSld>
@@ -7247,7 +7637,7 @@
             <a:pPr algn="l"/>
             <a:r>
               <a:rPr lang="en-US" sz="3600" dirty="0"/>
-              <a:t>Conclusions &amp; Appendix</a:t>
+              <a:t>Supporting Future Researchers on This Topic</a:t>
             </a:r>
           </a:p>
         </p:txBody>
@@ -7255,7 +7645,7 @@
     </p:spTree>
     <p:extLst>
       <p:ext uri="{BB962C8B-B14F-4D97-AF65-F5344CB8AC3E}">
-        <p14:creationId xmlns:p14="http://schemas.microsoft.com/office/powerpoint/2010/main" val="1047738926"/>
+        <p14:creationId xmlns:p14="http://schemas.microsoft.com/office/powerpoint/2010/main" val="2993728044"/>
       </p:ext>
     </p:extLst>
   </p:cSld>
@@ -7284,6 +7674,184 @@
       </p:grpSpPr>
       <p:sp>
         <p:nvSpPr>
+          <p:cNvPr id="4" name="Title 3">
+            <a:extLst>
+              <a:ext uri="{FF2B5EF4-FFF2-40B4-BE49-F238E27FC236}">
+                <a16:creationId xmlns:a16="http://schemas.microsoft.com/office/drawing/2014/main" id="{B9E80BC2-4589-4F4D-8C68-24FFC67D1426}"/>
+              </a:ext>
+            </a:extLst>
+          </p:cNvPr>
+          <p:cNvSpPr>
+            <a:spLocks noGrp="1"/>
+          </p:cNvSpPr>
+          <p:nvPr>
+            <p:ph type="ctrTitle"/>
+          </p:nvPr>
+        </p:nvSpPr>
+        <p:spPr>
+          <a:xfrm>
+            <a:off x="416859" y="1122363"/>
+            <a:ext cx="10838329" cy="2387600"/>
+          </a:xfrm>
+        </p:spPr>
+        <p:txBody>
+          <a:bodyPr>
+            <a:normAutofit/>
+          </a:bodyPr>
+          <a:lstStyle/>
+          <a:p>
+            <a:pPr algn="l"/>
+            <a:r>
+              <a:rPr lang="en-US" sz="3600" dirty="0"/>
+              <a:t>Conclusions &amp; Appendix</a:t>
+            </a:r>
+          </a:p>
+        </p:txBody>
+      </p:sp>
+    </p:spTree>
+    <p:extLst>
+      <p:ext uri="{BB962C8B-B14F-4D97-AF65-F5344CB8AC3E}">
+        <p14:creationId xmlns:p14="http://schemas.microsoft.com/office/powerpoint/2010/main" val="1047738926"/>
+      </p:ext>
+    </p:extLst>
+  </p:cSld>
+  <p:clrMapOvr>
+    <a:masterClrMapping/>
+  </p:clrMapOvr>
+</p:sld>
+</file>
+
+<file path=ppt/slides/slide3.xml><?xml version="1.0" encoding="utf-8"?>
+<p:sld xmlns:a="http://schemas.openxmlformats.org/drawingml/2006/main" xmlns:r="http://schemas.openxmlformats.org/officeDocument/2006/relationships" xmlns:p="http://schemas.openxmlformats.org/presentationml/2006/main">
+  <p:cSld>
+    <p:spTree>
+      <p:nvGrpSpPr>
+        <p:cNvPr id="1" name=""/>
+        <p:cNvGrpSpPr/>
+        <p:nvPr/>
+      </p:nvGrpSpPr>
+      <p:grpSpPr>
+        <a:xfrm>
+          <a:off x="0" y="0"/>
+          <a:ext cx="0" cy="0"/>
+          <a:chOff x="0" y="0"/>
+          <a:chExt cx="0" cy="0"/>
+        </a:xfrm>
+      </p:grpSpPr>
+      <p:sp>
+        <p:nvSpPr>
+          <p:cNvPr id="2" name="Title 1">
+            <a:extLst>
+              <a:ext uri="{FF2B5EF4-FFF2-40B4-BE49-F238E27FC236}">
+                <a16:creationId xmlns:a16="http://schemas.microsoft.com/office/drawing/2014/main" id="{C5E747E3-1B5F-D14C-BFD1-F80CCB693482}"/>
+              </a:ext>
+            </a:extLst>
+          </p:cNvPr>
+          <p:cNvSpPr>
+            <a:spLocks noGrp="1"/>
+          </p:cNvSpPr>
+          <p:nvPr>
+            <p:ph type="title"/>
+          </p:nvPr>
+        </p:nvSpPr>
+        <p:spPr/>
+        <p:txBody>
+          <a:bodyPr/>
+          <a:lstStyle/>
+          <a:p>
+            <a:r>
+              <a:rPr lang="en-US" dirty="0"/>
+              <a:t>Research Motivation – Why We Chose This Topic</a:t>
+            </a:r>
+          </a:p>
+        </p:txBody>
+      </p:sp>
+      <p:sp>
+        <p:nvSpPr>
+          <p:cNvPr id="3" name="Content Placeholder 2">
+            <a:extLst>
+              <a:ext uri="{FF2B5EF4-FFF2-40B4-BE49-F238E27FC236}">
+                <a16:creationId xmlns:a16="http://schemas.microsoft.com/office/drawing/2014/main" id="{41D4C6AE-E0B9-C04E-90F8-A885949ABDCF}"/>
+              </a:ext>
+            </a:extLst>
+          </p:cNvPr>
+          <p:cNvSpPr>
+            <a:spLocks noGrp="1"/>
+          </p:cNvSpPr>
+          <p:nvPr>
+            <p:ph idx="1"/>
+          </p:nvPr>
+        </p:nvSpPr>
+        <p:spPr/>
+        <p:txBody>
+          <a:bodyPr>
+            <a:normAutofit/>
+          </a:bodyPr>
+          <a:lstStyle/>
+          <a:p>
+            <a:r>
+              <a:rPr lang="en-US" dirty="0"/>
+              <a:t>Suicide is a national problem, deaths are tragic, also preventable</a:t>
+            </a:r>
+          </a:p>
+          <a:p>
+            <a:endParaRPr lang="en-US" dirty="0"/>
+          </a:p>
+          <a:p>
+            <a:r>
+              <a:rPr lang="en-US" dirty="0"/>
+              <a:t>The possibility of prevention and the scale of the problem highlight the need for policy makers, at the national level, to understand the factors that contribute to suicide not only in their respective countries but also in neighboring countries</a:t>
+            </a:r>
+          </a:p>
+          <a:p>
+            <a:endParaRPr lang="en-US" dirty="0"/>
+          </a:p>
+          <a:p>
+            <a:r>
+              <a:rPr lang="en-US" dirty="0"/>
+              <a:t>Quick Overview of Data Sources (no need to spend a lot of time here)</a:t>
+            </a:r>
+          </a:p>
+          <a:p>
+            <a:endParaRPr lang="en-US" dirty="0"/>
+          </a:p>
+          <a:p>
+            <a:endParaRPr lang="en-US" dirty="0"/>
+          </a:p>
+        </p:txBody>
+      </p:sp>
+    </p:spTree>
+    <p:extLst>
+      <p:ext uri="{BB962C8B-B14F-4D97-AF65-F5344CB8AC3E}">
+        <p14:creationId xmlns:p14="http://schemas.microsoft.com/office/powerpoint/2010/main" val="189507073"/>
+      </p:ext>
+    </p:extLst>
+  </p:cSld>
+  <p:clrMapOvr>
+    <a:masterClrMapping/>
+  </p:clrMapOvr>
+</p:sld>
+</file>
+
+<file path=ppt/slides/slide30.xml><?xml version="1.0" encoding="utf-8"?>
+<p:sld xmlns:a="http://schemas.openxmlformats.org/drawingml/2006/main" xmlns:r="http://schemas.openxmlformats.org/officeDocument/2006/relationships" xmlns:p="http://schemas.openxmlformats.org/presentationml/2006/main">
+  <p:cSld>
+    <p:spTree>
+      <p:nvGrpSpPr>
+        <p:cNvPr id="1" name=""/>
+        <p:cNvGrpSpPr/>
+        <p:nvPr/>
+      </p:nvGrpSpPr>
+      <p:grpSpPr>
+        <a:xfrm>
+          <a:off x="0" y="0"/>
+          <a:ext cx="0" cy="0"/>
+          <a:chOff x="0" y="0"/>
+          <a:chExt cx="0" cy="0"/>
+        </a:xfrm>
+      </p:grpSpPr>
+      <p:sp>
+        <p:nvSpPr>
           <p:cNvPr id="2" name="Title 1">
             <a:extLst>
               <a:ext uri="{FF2B5EF4-FFF2-40B4-BE49-F238E27FC236}">
@@ -7326,8 +7894,8 @@
           </a:p>
         </p:txBody>
       </p:sp>
-      <mc:AlternateContent xmlns:mc="http://schemas.openxmlformats.org/markup-compatibility/2006">
-        <mc:Choice xmlns:a14="http://schemas.microsoft.com/office/drawing/2010/main" Requires="a14">
+      <mc:AlternateContent xmlns:mc="http://schemas.openxmlformats.org/markup-compatibility/2006" xmlns:a14="http://schemas.microsoft.com/office/drawing/2010/main">
+        <mc:Choice Requires="a14">
           <p:sp>
             <p:nvSpPr>
               <p:cNvPr id="3" name="Content Placeholder 2">
@@ -7597,7 +8165,7 @@
             </p:txBody>
           </p:sp>
         </mc:Choice>
-        <mc:Fallback>
+        <mc:Fallback xmlns="">
           <p:sp>
             <p:nvSpPr>
               <p:cNvPr id="3" name="Content Placeholder 2">
@@ -7728,7 +8296,7 @@
 </p:sld>
 </file>
 
-<file path=ppt/slides/slide3.xml><?xml version="1.0" encoding="utf-8"?>
+<file path=ppt/slides/slide31.xml><?xml version="1.0" encoding="utf-8"?>
 <p:sld xmlns:a="http://schemas.openxmlformats.org/drawingml/2006/main" xmlns:r="http://schemas.openxmlformats.org/officeDocument/2006/relationships" xmlns:p="http://schemas.openxmlformats.org/presentationml/2006/main">
   <p:cSld>
     <p:spTree>
@@ -7750,118 +8318,6 @@
           <p:cNvPr id="2" name="Title 1">
             <a:extLst>
               <a:ext uri="{FF2B5EF4-FFF2-40B4-BE49-F238E27FC236}">
-                <a16:creationId xmlns:a16="http://schemas.microsoft.com/office/drawing/2014/main" id="{C5E747E3-1B5F-D14C-BFD1-F80CCB693482}"/>
-              </a:ext>
-            </a:extLst>
-          </p:cNvPr>
-          <p:cNvSpPr>
-            <a:spLocks noGrp="1"/>
-          </p:cNvSpPr>
-          <p:nvPr>
-            <p:ph type="title"/>
-          </p:nvPr>
-        </p:nvSpPr>
-        <p:spPr/>
-        <p:txBody>
-          <a:bodyPr/>
-          <a:lstStyle/>
-          <a:p>
-            <a:r>
-              <a:rPr lang="en-US" dirty="0"/>
-              <a:t>Research Motivation – Why We Chose This Topic</a:t>
-            </a:r>
-          </a:p>
-        </p:txBody>
-      </p:sp>
-      <p:sp>
-        <p:nvSpPr>
-          <p:cNvPr id="3" name="Content Placeholder 2">
-            <a:extLst>
-              <a:ext uri="{FF2B5EF4-FFF2-40B4-BE49-F238E27FC236}">
-                <a16:creationId xmlns:a16="http://schemas.microsoft.com/office/drawing/2014/main" id="{41D4C6AE-E0B9-C04E-90F8-A885949ABDCF}"/>
-              </a:ext>
-            </a:extLst>
-          </p:cNvPr>
-          <p:cNvSpPr>
-            <a:spLocks noGrp="1"/>
-          </p:cNvSpPr>
-          <p:nvPr>
-            <p:ph idx="1"/>
-          </p:nvPr>
-        </p:nvSpPr>
-        <p:spPr/>
-        <p:txBody>
-          <a:bodyPr>
-            <a:normAutofit/>
-          </a:bodyPr>
-          <a:lstStyle/>
-          <a:p>
-            <a:r>
-              <a:rPr lang="en-US" dirty="0"/>
-              <a:t>Suicide is a national problem, deaths are tragic, also preventable</a:t>
-            </a:r>
-          </a:p>
-          <a:p>
-            <a:endParaRPr lang="en-US" dirty="0"/>
-          </a:p>
-          <a:p>
-            <a:r>
-              <a:rPr lang="en-US" dirty="0"/>
-              <a:t>The possibility of prevention and the scale of the problem highlight the need for policy makers, at the national level, to understand the factors that contribute to suicide not only in their respective countries but also in neighboring countries</a:t>
-            </a:r>
-          </a:p>
-          <a:p>
-            <a:endParaRPr lang="en-US" dirty="0"/>
-          </a:p>
-          <a:p>
-            <a:r>
-              <a:rPr lang="en-US" dirty="0"/>
-              <a:t>Quick Overview of Data Sources (no need to spend a lot of time here)</a:t>
-            </a:r>
-          </a:p>
-          <a:p>
-            <a:endParaRPr lang="en-US" dirty="0"/>
-          </a:p>
-          <a:p>
-            <a:endParaRPr lang="en-US" dirty="0"/>
-          </a:p>
-        </p:txBody>
-      </p:sp>
-    </p:spTree>
-    <p:extLst>
-      <p:ext uri="{BB962C8B-B14F-4D97-AF65-F5344CB8AC3E}">
-        <p14:creationId xmlns:p14="http://schemas.microsoft.com/office/powerpoint/2010/main" val="189507073"/>
-      </p:ext>
-    </p:extLst>
-  </p:cSld>
-  <p:clrMapOvr>
-    <a:masterClrMapping/>
-  </p:clrMapOvr>
-</p:sld>
-</file>
-
-<file path=ppt/slides/slide30.xml><?xml version="1.0" encoding="utf-8"?>
-<p:sld xmlns:a="http://schemas.openxmlformats.org/drawingml/2006/main" xmlns:r="http://schemas.openxmlformats.org/officeDocument/2006/relationships" xmlns:p="http://schemas.openxmlformats.org/presentationml/2006/main">
-  <p:cSld>
-    <p:spTree>
-      <p:nvGrpSpPr>
-        <p:cNvPr id="1" name=""/>
-        <p:cNvGrpSpPr/>
-        <p:nvPr/>
-      </p:nvGrpSpPr>
-      <p:grpSpPr>
-        <a:xfrm>
-          <a:off x="0" y="0"/>
-          <a:ext cx="0" cy="0"/>
-          <a:chOff x="0" y="0"/>
-          <a:chExt cx="0" cy="0"/>
-        </a:xfrm>
-      </p:grpSpPr>
-      <p:sp>
-        <p:nvSpPr>
-          <p:cNvPr id="2" name="Title 1">
-            <a:extLst>
-              <a:ext uri="{FF2B5EF4-FFF2-40B4-BE49-F238E27FC236}">
                 <a16:creationId xmlns:a16="http://schemas.microsoft.com/office/drawing/2014/main" id="{12AD50CE-1696-4F8F-9805-1D32740E91D0}"/>
               </a:ext>
             </a:extLst>
@@ -7885,8 +8341,8 @@
           </a:p>
         </p:txBody>
       </p:sp>
-      <mc:AlternateContent xmlns:mc="http://schemas.openxmlformats.org/markup-compatibility/2006">
-        <mc:Choice xmlns:a14="http://schemas.microsoft.com/office/drawing/2010/main" Requires="a14">
+      <mc:AlternateContent xmlns:mc="http://schemas.openxmlformats.org/markup-compatibility/2006" xmlns:a14="http://schemas.microsoft.com/office/drawing/2010/main">
+        <mc:Choice Requires="a14">
           <p:sp>
             <p:nvSpPr>
               <p:cNvPr id="3" name="Content Placeholder 2">
@@ -8197,7 +8653,7 @@
             </p:txBody>
           </p:sp>
         </mc:Choice>
-        <mc:Fallback>
+        <mc:Fallback xmlns="">
           <p:sp>
             <p:nvSpPr>
               <p:cNvPr id="3" name="Content Placeholder 2">
@@ -8415,7 +8871,7 @@
 </p:sld>
 </file>
 
-<file path=ppt/slides/slide31.xml><?xml version="1.0" encoding="utf-8"?>
+<file path=ppt/slides/slide32.xml><?xml version="1.0" encoding="utf-8"?>
 <p:sld xmlns:a="http://schemas.openxmlformats.org/drawingml/2006/main" xmlns:r="http://schemas.openxmlformats.org/officeDocument/2006/relationships" xmlns:p="http://schemas.openxmlformats.org/presentationml/2006/main">
   <p:cSld>
     <p:spTree>
@@ -8570,7 +9026,7 @@
 </p:sld>
 </file>
 
-<file path=ppt/slides/slide32.xml><?xml version="1.0" encoding="utf-8"?>
+<file path=ppt/slides/slide33.xml><?xml version="1.0" encoding="utf-8"?>
 <p:sld xmlns:a="http://schemas.openxmlformats.org/drawingml/2006/main" xmlns:r="http://schemas.openxmlformats.org/officeDocument/2006/relationships" xmlns:p="http://schemas.openxmlformats.org/presentationml/2006/main">
   <p:cSld>
     <p:spTree>
@@ -8693,217 +9149,6 @@
 </p:sld>
 </file>
 
-<file path=ppt/slides/slide33.xml><?xml version="1.0" encoding="utf-8"?>
-<p:sld xmlns:a="http://schemas.openxmlformats.org/drawingml/2006/main" xmlns:r="http://schemas.openxmlformats.org/officeDocument/2006/relationships" xmlns:p="http://schemas.openxmlformats.org/presentationml/2006/main">
-  <p:cSld>
-    <p:spTree>
-      <p:nvGrpSpPr>
-        <p:cNvPr id="1" name=""/>
-        <p:cNvGrpSpPr/>
-        <p:nvPr/>
-      </p:nvGrpSpPr>
-      <p:grpSpPr>
-        <a:xfrm>
-          <a:off x="0" y="0"/>
-          <a:ext cx="0" cy="0"/>
-          <a:chOff x="0" y="0"/>
-          <a:chExt cx="0" cy="0"/>
-        </a:xfrm>
-      </p:grpSpPr>
-      <p:sp>
-        <p:nvSpPr>
-          <p:cNvPr id="2" name="Title 1">
-            <a:extLst>
-              <a:ext uri="{FF2B5EF4-FFF2-40B4-BE49-F238E27FC236}">
-                <a16:creationId xmlns:a16="http://schemas.microsoft.com/office/drawing/2014/main" id="{970F0530-F960-44B4-B6A6-9665E584336A}"/>
-              </a:ext>
-            </a:extLst>
-          </p:cNvPr>
-          <p:cNvSpPr>
-            <a:spLocks noGrp="1"/>
-          </p:cNvSpPr>
-          <p:nvPr>
-            <p:ph type="title"/>
-          </p:nvPr>
-        </p:nvSpPr>
-        <p:spPr/>
-        <p:txBody>
-          <a:bodyPr/>
-          <a:lstStyle/>
-          <a:p>
-            <a:r>
-              <a:rPr lang="en-US" dirty="0"/>
-              <a:t>Model Development – Remove Outliers</a:t>
-            </a:r>
-          </a:p>
-        </p:txBody>
-      </p:sp>
-      <p:sp>
-        <p:nvSpPr>
-          <p:cNvPr id="3" name="Content Placeholder 2">
-            <a:extLst>
-              <a:ext uri="{FF2B5EF4-FFF2-40B4-BE49-F238E27FC236}">
-                <a16:creationId xmlns:a16="http://schemas.microsoft.com/office/drawing/2014/main" id="{DFC3F2D1-924B-437D-BE9B-9C332EBCF026}"/>
-              </a:ext>
-            </a:extLst>
-          </p:cNvPr>
-          <p:cNvSpPr>
-            <a:spLocks noGrp="1"/>
-          </p:cNvSpPr>
-          <p:nvPr>
-            <p:ph idx="1"/>
-          </p:nvPr>
-        </p:nvSpPr>
-        <p:spPr>
-          <a:xfrm>
-            <a:off x="750013" y="1561672"/>
-            <a:ext cx="10798140" cy="5296327"/>
-          </a:xfrm>
-        </p:spPr>
-        <p:txBody>
-          <a:bodyPr>
-            <a:normAutofit fontScale="62500" lnSpcReduction="20000"/>
-          </a:bodyPr>
-          <a:lstStyle/>
-          <a:p>
-            <a:r>
-              <a:rPr lang="en-US" dirty="0"/>
-              <a:t>Points 12, 65, 79, and 88 also had country specific reasons for being removed from the data set </a:t>
-            </a:r>
-          </a:p>
-          <a:p>
-            <a:endParaRPr lang="en-US" dirty="0"/>
-          </a:p>
-          <a:p>
-            <a:r>
-              <a:rPr lang="en-US" dirty="0"/>
-              <a:t>12 – Barbados:</a:t>
-            </a:r>
-          </a:p>
-          <a:p>
-            <a:pPr lvl="1"/>
-            <a:r>
-              <a:rPr lang="en-US" dirty="0"/>
-              <a:t> Caribbean's leading tourism island, transitioned from agricultural to service based economy very successfully </a:t>
-            </a:r>
-          </a:p>
-          <a:p>
-            <a:pPr lvl="1"/>
-            <a:r>
-              <a:rPr lang="en-US" dirty="0"/>
-              <a:t> “very high human development‟ status in terms of the UNDP’s human development index</a:t>
-            </a:r>
-          </a:p>
-          <a:p>
-            <a:pPr lvl="1"/>
-            <a:r>
-              <a:rPr lang="en-US" dirty="0"/>
-              <a:t>Extremely low suicide rate</a:t>
-            </a:r>
-          </a:p>
-          <a:p>
-            <a:r>
-              <a:rPr lang="en-US" dirty="0"/>
-              <a:t>65 – Guyana: </a:t>
-            </a:r>
-          </a:p>
-          <a:p>
-            <a:pPr lvl="1"/>
-            <a:r>
-              <a:rPr lang="en-US" dirty="0"/>
-              <a:t>Extremely poor island country largely made up of agricultural villages.</a:t>
-            </a:r>
-          </a:p>
-          <a:p>
-            <a:pPr lvl="1"/>
-            <a:r>
-              <a:rPr lang="en-US" dirty="0"/>
-              <a:t>Very high alcohol and suicide statistics</a:t>
-            </a:r>
-          </a:p>
-          <a:p>
-            <a:pPr lvl="1"/>
-            <a:r>
-              <a:rPr lang="en-US" dirty="0"/>
-              <a:t>Ministry of health identified poverty, pervasive stigma about mental illness, access to lethal chemicals, alcohol misuse, interpersonal violence, family dysfunction and insufficient mental health resources as key factors causing one of the highest suicide rates in the world.</a:t>
-            </a:r>
-          </a:p>
-          <a:p>
-            <a:r>
-              <a:rPr lang="en-US" dirty="0"/>
-              <a:t>79 – Japan:</a:t>
-            </a:r>
-          </a:p>
-          <a:p>
-            <a:pPr lvl="1"/>
-            <a:r>
-              <a:rPr lang="en-US" dirty="0"/>
-              <a:t>Notoriously overworked and over stressed population, although the country is very wealthy</a:t>
-            </a:r>
-          </a:p>
-          <a:p>
-            <a:pPr lvl="1"/>
-            <a:r>
-              <a:rPr lang="en-US" dirty="0"/>
-              <a:t>Long cultural history of considering certain types of suicides honorable, relatively high cultural tolerance for suicide</a:t>
-            </a:r>
-          </a:p>
-          <a:p>
-            <a:pPr lvl="1"/>
-            <a:r>
-              <a:rPr lang="en-US" dirty="0"/>
-              <a:t>Very high suicide rate when compared to other rich nations</a:t>
-            </a:r>
-          </a:p>
-          <a:p>
-            <a:r>
-              <a:rPr lang="en-US" dirty="0"/>
-              <a:t>88 – Lesotho:</a:t>
-            </a:r>
-          </a:p>
-          <a:p>
-            <a:pPr lvl="1"/>
-            <a:r>
-              <a:rPr lang="en-US" dirty="0"/>
-              <a:t>Small, landlocked, mountainous country in Africa</a:t>
-            </a:r>
-          </a:p>
-          <a:p>
-            <a:pPr lvl="1"/>
-            <a:r>
-              <a:rPr lang="en-US" dirty="0"/>
-              <a:t>Highest suicide rate in Africa</a:t>
-            </a:r>
-          </a:p>
-          <a:p>
-            <a:pPr lvl="1"/>
-            <a:r>
-              <a:rPr lang="en-US" dirty="0"/>
-              <a:t>High levels of child labor</a:t>
-            </a:r>
-          </a:p>
-          <a:p>
-            <a:pPr lvl="1"/>
-            <a:r>
-              <a:rPr lang="en-US" dirty="0"/>
-              <a:t>Very poor general health outcomes, ex. second highest instances of tuberculosis and HIV/AIDS in the world </a:t>
-            </a:r>
-          </a:p>
-        </p:txBody>
-      </p:sp>
-    </p:spTree>
-    <p:extLst>
-      <p:ext uri="{BB962C8B-B14F-4D97-AF65-F5344CB8AC3E}">
-        <p14:creationId xmlns:p14="http://schemas.microsoft.com/office/powerpoint/2010/main" val="2563061270"/>
-      </p:ext>
-    </p:extLst>
-  </p:cSld>
-  <p:clrMapOvr>
-    <a:masterClrMapping/>
-  </p:clrMapOvr>
-</p:sld>
-</file>
-
 <file path=ppt/slides/slide34.xml><?xml version="1.0" encoding="utf-8"?>
 <p:sld xmlns:a="http://schemas.openxmlformats.org/drawingml/2006/main" xmlns:r="http://schemas.openxmlformats.org/officeDocument/2006/relationships" xmlns:p="http://schemas.openxmlformats.org/presentationml/2006/main">
   <p:cSld>
@@ -8926,6 +9171,217 @@
           <p:cNvPr id="2" name="Title 1">
             <a:extLst>
               <a:ext uri="{FF2B5EF4-FFF2-40B4-BE49-F238E27FC236}">
+                <a16:creationId xmlns:a16="http://schemas.microsoft.com/office/drawing/2014/main" id="{970F0530-F960-44B4-B6A6-9665E584336A}"/>
+              </a:ext>
+            </a:extLst>
+          </p:cNvPr>
+          <p:cNvSpPr>
+            <a:spLocks noGrp="1"/>
+          </p:cNvSpPr>
+          <p:nvPr>
+            <p:ph type="title"/>
+          </p:nvPr>
+        </p:nvSpPr>
+        <p:spPr/>
+        <p:txBody>
+          <a:bodyPr/>
+          <a:lstStyle/>
+          <a:p>
+            <a:r>
+              <a:rPr lang="en-US" dirty="0"/>
+              <a:t>Model Development – Remove Outliers</a:t>
+            </a:r>
+          </a:p>
+        </p:txBody>
+      </p:sp>
+      <p:sp>
+        <p:nvSpPr>
+          <p:cNvPr id="3" name="Content Placeholder 2">
+            <a:extLst>
+              <a:ext uri="{FF2B5EF4-FFF2-40B4-BE49-F238E27FC236}">
+                <a16:creationId xmlns:a16="http://schemas.microsoft.com/office/drawing/2014/main" id="{DFC3F2D1-924B-437D-BE9B-9C332EBCF026}"/>
+              </a:ext>
+            </a:extLst>
+          </p:cNvPr>
+          <p:cNvSpPr>
+            <a:spLocks noGrp="1"/>
+          </p:cNvSpPr>
+          <p:nvPr>
+            <p:ph idx="1"/>
+          </p:nvPr>
+        </p:nvSpPr>
+        <p:spPr>
+          <a:xfrm>
+            <a:off x="750013" y="1561672"/>
+            <a:ext cx="10798140" cy="5296327"/>
+          </a:xfrm>
+        </p:spPr>
+        <p:txBody>
+          <a:bodyPr>
+            <a:normAutofit fontScale="62500" lnSpcReduction="20000"/>
+          </a:bodyPr>
+          <a:lstStyle/>
+          <a:p>
+            <a:r>
+              <a:rPr lang="en-US" dirty="0"/>
+              <a:t>Points 12, 65, 79, and 88 also had country specific reasons for being removed from the data set </a:t>
+            </a:r>
+          </a:p>
+          <a:p>
+            <a:endParaRPr lang="en-US" dirty="0"/>
+          </a:p>
+          <a:p>
+            <a:r>
+              <a:rPr lang="en-US" dirty="0"/>
+              <a:t>12 – Barbados:</a:t>
+            </a:r>
+          </a:p>
+          <a:p>
+            <a:pPr lvl="1"/>
+            <a:r>
+              <a:rPr lang="en-US" dirty="0"/>
+              <a:t> Caribbean's leading tourism island, transitioned from agricultural to service based economy very successfully </a:t>
+            </a:r>
+          </a:p>
+          <a:p>
+            <a:pPr lvl="1"/>
+            <a:r>
+              <a:rPr lang="en-US" dirty="0"/>
+              <a:t> “very high human development‟ status in terms of the UNDP’s human development index</a:t>
+            </a:r>
+          </a:p>
+          <a:p>
+            <a:pPr lvl="1"/>
+            <a:r>
+              <a:rPr lang="en-US" dirty="0"/>
+              <a:t>Extremely low suicide rate</a:t>
+            </a:r>
+          </a:p>
+          <a:p>
+            <a:r>
+              <a:rPr lang="en-US" dirty="0"/>
+              <a:t>65 – Guyana: </a:t>
+            </a:r>
+          </a:p>
+          <a:p>
+            <a:pPr lvl="1"/>
+            <a:r>
+              <a:rPr lang="en-US" dirty="0"/>
+              <a:t>Extremely poor island country largely made up of agricultural villages.</a:t>
+            </a:r>
+          </a:p>
+          <a:p>
+            <a:pPr lvl="1"/>
+            <a:r>
+              <a:rPr lang="en-US" dirty="0"/>
+              <a:t>Very high alcohol and suicide statistics</a:t>
+            </a:r>
+          </a:p>
+          <a:p>
+            <a:pPr lvl="1"/>
+            <a:r>
+              <a:rPr lang="en-US" dirty="0"/>
+              <a:t>Ministry of health identified poverty, pervasive stigma about mental illness, access to lethal chemicals, alcohol misuse, interpersonal violence, family dysfunction and insufficient mental health resources as key factors causing one of the highest suicide rates in the world.</a:t>
+            </a:r>
+          </a:p>
+          <a:p>
+            <a:r>
+              <a:rPr lang="en-US" dirty="0"/>
+              <a:t>79 – Japan:</a:t>
+            </a:r>
+          </a:p>
+          <a:p>
+            <a:pPr lvl="1"/>
+            <a:r>
+              <a:rPr lang="en-US" dirty="0"/>
+              <a:t>Notoriously overworked and over stressed population, although the country is very wealthy</a:t>
+            </a:r>
+          </a:p>
+          <a:p>
+            <a:pPr lvl="1"/>
+            <a:r>
+              <a:rPr lang="en-US" dirty="0"/>
+              <a:t>Long cultural history of considering certain types of suicides honorable, relatively high cultural tolerance for suicide</a:t>
+            </a:r>
+          </a:p>
+          <a:p>
+            <a:pPr lvl="1"/>
+            <a:r>
+              <a:rPr lang="en-US" dirty="0"/>
+              <a:t>Very high suicide rate when compared to other rich nations</a:t>
+            </a:r>
+          </a:p>
+          <a:p>
+            <a:r>
+              <a:rPr lang="en-US" dirty="0"/>
+              <a:t>88 – Lesotho:</a:t>
+            </a:r>
+          </a:p>
+          <a:p>
+            <a:pPr lvl="1"/>
+            <a:r>
+              <a:rPr lang="en-US" dirty="0"/>
+              <a:t>Small, landlocked, mountainous country in Africa</a:t>
+            </a:r>
+          </a:p>
+          <a:p>
+            <a:pPr lvl="1"/>
+            <a:r>
+              <a:rPr lang="en-US" dirty="0"/>
+              <a:t>Highest suicide rate in Africa</a:t>
+            </a:r>
+          </a:p>
+          <a:p>
+            <a:pPr lvl="1"/>
+            <a:r>
+              <a:rPr lang="en-US" dirty="0"/>
+              <a:t>High levels of child labor</a:t>
+            </a:r>
+          </a:p>
+          <a:p>
+            <a:pPr lvl="1"/>
+            <a:r>
+              <a:rPr lang="en-US" dirty="0"/>
+              <a:t>Very poor general health outcomes, ex. second highest instances of tuberculosis and HIV/AIDS in the world </a:t>
+            </a:r>
+          </a:p>
+        </p:txBody>
+      </p:sp>
+    </p:spTree>
+    <p:extLst>
+      <p:ext uri="{BB962C8B-B14F-4D97-AF65-F5344CB8AC3E}">
+        <p14:creationId xmlns:p14="http://schemas.microsoft.com/office/powerpoint/2010/main" val="2563061270"/>
+      </p:ext>
+    </p:extLst>
+  </p:cSld>
+  <p:clrMapOvr>
+    <a:masterClrMapping/>
+  </p:clrMapOvr>
+</p:sld>
+</file>
+
+<file path=ppt/slides/slide35.xml><?xml version="1.0" encoding="utf-8"?>
+<p:sld xmlns:a="http://schemas.openxmlformats.org/drawingml/2006/main" xmlns:r="http://schemas.openxmlformats.org/officeDocument/2006/relationships" xmlns:p="http://schemas.openxmlformats.org/presentationml/2006/main">
+  <p:cSld>
+    <p:spTree>
+      <p:nvGrpSpPr>
+        <p:cNvPr id="1" name=""/>
+        <p:cNvGrpSpPr/>
+        <p:nvPr/>
+      </p:nvGrpSpPr>
+      <p:grpSpPr>
+        <a:xfrm>
+          <a:off x="0" y="0"/>
+          <a:ext cx="0" cy="0"/>
+          <a:chOff x="0" y="0"/>
+          <a:chExt cx="0" cy="0"/>
+        </a:xfrm>
+      </p:grpSpPr>
+      <p:sp>
+        <p:nvSpPr>
+          <p:cNvPr id="2" name="Title 1">
+            <a:extLst>
+              <a:ext uri="{FF2B5EF4-FFF2-40B4-BE49-F238E27FC236}">
                 <a16:creationId xmlns:a16="http://schemas.microsoft.com/office/drawing/2014/main" id="{12AD50CE-1696-4F8F-9805-1D32740E91D0}"/>
               </a:ext>
             </a:extLst>
@@ -9054,8 +9510,8 @@
           </a:p>
         </p:txBody>
       </p:sp>
-      <mc:AlternateContent xmlns:mc="http://schemas.openxmlformats.org/markup-compatibility/2006">
-        <mc:Choice xmlns:a14="http://schemas.microsoft.com/office/drawing/2010/main" Requires="a14">
+      <mc:AlternateContent xmlns:mc="http://schemas.openxmlformats.org/markup-compatibility/2006" xmlns:a14="http://schemas.microsoft.com/office/drawing/2010/main">
+        <mc:Choice Requires="a14">
           <p:sp>
             <p:nvSpPr>
               <p:cNvPr id="7" name="Content Placeholder 2">
@@ -9443,7 +9899,7 @@
             </p:txBody>
           </p:sp>
         </mc:Choice>
-        <mc:Fallback>
+        <mc:Fallback xmlns="">
           <p:sp>
             <p:nvSpPr>
               <p:cNvPr id="7" name="Content Placeholder 2">
@@ -9488,6 +9944,62 @@
           </p:sp>
         </mc:Fallback>
       </mc:AlternateContent>
+      <p:sp>
+        <p:nvSpPr>
+          <p:cNvPr id="5" name="Rectangle 4">
+            <a:extLst>
+              <a:ext uri="{FF2B5EF4-FFF2-40B4-BE49-F238E27FC236}">
+                <a16:creationId xmlns:a16="http://schemas.microsoft.com/office/drawing/2014/main" id="{313DD98F-E13F-4181-8C3E-E29D89B916A4}"/>
+              </a:ext>
+            </a:extLst>
+          </p:cNvPr>
+          <p:cNvSpPr/>
+          <p:nvPr/>
+        </p:nvSpPr>
+        <p:spPr>
+          <a:xfrm rot="1919411">
+            <a:off x="5688047" y="1568560"/>
+            <a:ext cx="5367131" cy="2874312"/>
+          </a:xfrm>
+          <a:prstGeom prst="rect">
+            <a:avLst/>
+          </a:prstGeom>
+          <a:solidFill>
+            <a:srgbClr val="FF0000"/>
+          </a:solidFill>
+        </p:spPr>
+        <p:style>
+          <a:lnRef idx="2">
+            <a:schemeClr val="accent2">
+              <a:shade val="50000"/>
+            </a:schemeClr>
+          </a:lnRef>
+          <a:fillRef idx="1">
+            <a:schemeClr val="accent2"/>
+          </a:fillRef>
+          <a:effectRef idx="0">
+            <a:schemeClr val="accent2"/>
+          </a:effectRef>
+          <a:fontRef idx="minor">
+            <a:schemeClr val="lt1"/>
+          </a:fontRef>
+        </p:style>
+        <p:txBody>
+          <a:bodyPr rtlCol="0" anchor="ctr"/>
+          <a:lstStyle/>
+          <a:p>
+            <a:pPr algn="ctr"/>
+            <a:r>
+              <a:rPr lang="en-US" sz="6000" dirty="0" err="1"/>
+              <a:t>qqOsman</a:t>
+            </a:r>
+            <a:r>
+              <a:rPr lang="en-US" sz="6000" dirty="0"/>
+              <a:t>, Removed Vars is wrong</a:t>
+            </a:r>
+          </a:p>
+        </p:txBody>
+      </p:sp>
     </p:spTree>
     <p:extLst>
       <p:ext uri="{BB962C8B-B14F-4D97-AF65-F5344CB8AC3E}">
@@ -9501,7 +10013,7 @@
 </p:sld>
 </file>
 
-<file path=ppt/slides/slide35.xml><?xml version="1.0" encoding="utf-8"?>
+<file path=ppt/slides/slide36.xml><?xml version="1.0" encoding="utf-8"?>
 <p:sld xmlns:a="http://schemas.openxmlformats.org/drawingml/2006/main" xmlns:r="http://schemas.openxmlformats.org/officeDocument/2006/relationships" xmlns:p="http://schemas.openxmlformats.org/presentationml/2006/main">
   <p:cSld>
     <p:bg>
@@ -10133,14 +10645,14 @@
           <p:nvPr>
             <p:extLst>
               <p:ext uri="{D42A27DB-BD31-4B8C-83A1-F6EECF244321}">
-                <p14:modId xmlns:p14="http://schemas.microsoft.com/office/powerpoint/2010/main" val="2009046471"/>
+                <p14:modId xmlns:p14="http://schemas.microsoft.com/office/powerpoint/2010/main" val="3139366197"/>
               </p:ext>
             </p:extLst>
           </p:nvPr>
         </p:nvGraphicFramePr>
         <p:xfrm>
           <a:off x="828336" y="1429879"/>
-          <a:ext cx="10525463" cy="5561221"/>
+          <a:ext cx="10525463" cy="5634756"/>
         </p:xfrm>
         <a:graphic>
           <a:graphicData uri="http://schemas.openxmlformats.org/drawingml/2006/table">
@@ -10456,10 +10968,9 @@
                     <a:lstStyle/>
                     <a:p>
                       <a:r>
-                        <a:rPr lang="en-US" sz="1400" dirty="0" err="1"/>
-                        <a:t>qqPeter</a:t>
+                        <a:rPr lang="en-US" sz="1400" dirty="0"/>
+                        <a:t>Countries which have a “stand-alone” national suicide prevention strategy (NSPSs) are included as 1s, else 0. These NSPSs have implemented policies which combat suicide. </a:t>
                       </a:r>
-                      <a:endParaRPr lang="en-US" sz="1400" dirty="0"/>
                     </a:p>
                   </a:txBody>
                   <a:tcPr/>

</xml_diff>